<commit_message>
list remaining lecture topics
</commit_message>
<xml_diff>
--- a/IAP-CSharp-Lecture-2.pptx
+++ b/IAP-CSharp-Lecture-2.pptx
@@ -42,19 +42,18 @@
     <p:sldId id="304" r:id="rId36"/>
     <p:sldId id="306" r:id="rId37"/>
     <p:sldId id="302" r:id="rId38"/>
-    <p:sldId id="308" r:id="rId39"/>
-    <p:sldId id="307" r:id="rId40"/>
-    <p:sldId id="309" r:id="rId41"/>
-    <p:sldId id="310" r:id="rId42"/>
-    <p:sldId id="311" r:id="rId43"/>
-    <p:sldId id="312" r:id="rId44"/>
-    <p:sldId id="313" r:id="rId45"/>
-    <p:sldId id="314" r:id="rId46"/>
-    <p:sldId id="315" r:id="rId47"/>
-    <p:sldId id="317" r:id="rId48"/>
-    <p:sldId id="318" r:id="rId49"/>
-    <p:sldId id="319" r:id="rId50"/>
-    <p:sldId id="316" r:id="rId51"/>
+    <p:sldId id="307" r:id="rId39"/>
+    <p:sldId id="309" r:id="rId40"/>
+    <p:sldId id="310" r:id="rId41"/>
+    <p:sldId id="311" r:id="rId42"/>
+    <p:sldId id="312" r:id="rId43"/>
+    <p:sldId id="313" r:id="rId44"/>
+    <p:sldId id="314" r:id="rId45"/>
+    <p:sldId id="315" r:id="rId46"/>
+    <p:sldId id="317" r:id="rId47"/>
+    <p:sldId id="318" r:id="rId48"/>
+    <p:sldId id="319" r:id="rId49"/>
+    <p:sldId id="316" r:id="rId50"/>
   </p:sldIdLst>
   <p:sldSz cx="9144000" cy="6858000" type="screen4x3"/>
   <p:notesSz cx="6858000" cy="9144000"/>
@@ -337,7 +336,7 @@
           <a:p>
             <a:fld id="{289436DB-F1B6-4655-9920-C66902317381}" type="datetimeFigureOut">
               <a:rPr lang="en-US" smtClean="0"/>
-              <a:t>1/10/2011</a:t>
+              <a:t>1/11/2011</a:t>
             </a:fld>
             <a:endParaRPr lang="en-US"/>
           </a:p>
@@ -507,7 +506,7 @@
           <a:p>
             <a:fld id="{289436DB-F1B6-4655-9920-C66902317381}" type="datetimeFigureOut">
               <a:rPr lang="en-US" smtClean="0"/>
-              <a:t>1/10/2011</a:t>
+              <a:t>1/11/2011</a:t>
             </a:fld>
             <a:endParaRPr lang="en-US"/>
           </a:p>
@@ -687,7 +686,7 @@
           <a:p>
             <a:fld id="{289436DB-F1B6-4655-9920-C66902317381}" type="datetimeFigureOut">
               <a:rPr lang="en-US" smtClean="0"/>
-              <a:t>1/10/2011</a:t>
+              <a:t>1/11/2011</a:t>
             </a:fld>
             <a:endParaRPr lang="en-US"/>
           </a:p>
@@ -857,7 +856,7 @@
           <a:p>
             <a:fld id="{289436DB-F1B6-4655-9920-C66902317381}" type="datetimeFigureOut">
               <a:rPr lang="en-US" smtClean="0"/>
-              <a:t>1/10/2011</a:t>
+              <a:t>1/11/2011</a:t>
             </a:fld>
             <a:endParaRPr lang="en-US"/>
           </a:p>
@@ -1103,7 +1102,7 @@
           <a:p>
             <a:fld id="{289436DB-F1B6-4655-9920-C66902317381}" type="datetimeFigureOut">
               <a:rPr lang="en-US" smtClean="0"/>
-              <a:t>1/10/2011</a:t>
+              <a:t>1/11/2011</a:t>
             </a:fld>
             <a:endParaRPr lang="en-US"/>
           </a:p>
@@ -1391,7 +1390,7 @@
           <a:p>
             <a:fld id="{289436DB-F1B6-4655-9920-C66902317381}" type="datetimeFigureOut">
               <a:rPr lang="en-US" smtClean="0"/>
-              <a:t>1/10/2011</a:t>
+              <a:t>1/11/2011</a:t>
             </a:fld>
             <a:endParaRPr lang="en-US"/>
           </a:p>
@@ -1813,7 +1812,7 @@
           <a:p>
             <a:fld id="{289436DB-F1B6-4655-9920-C66902317381}" type="datetimeFigureOut">
               <a:rPr lang="en-US" smtClean="0"/>
-              <a:t>1/10/2011</a:t>
+              <a:t>1/11/2011</a:t>
             </a:fld>
             <a:endParaRPr lang="en-US"/>
           </a:p>
@@ -1931,7 +1930,7 @@
           <a:p>
             <a:fld id="{289436DB-F1B6-4655-9920-C66902317381}" type="datetimeFigureOut">
               <a:rPr lang="en-US" smtClean="0"/>
-              <a:t>1/10/2011</a:t>
+              <a:t>1/11/2011</a:t>
             </a:fld>
             <a:endParaRPr lang="en-US"/>
           </a:p>
@@ -2026,7 +2025,7 @@
           <a:p>
             <a:fld id="{289436DB-F1B6-4655-9920-C66902317381}" type="datetimeFigureOut">
               <a:rPr lang="en-US" smtClean="0"/>
-              <a:t>1/10/2011</a:t>
+              <a:t>1/11/2011</a:t>
             </a:fld>
             <a:endParaRPr lang="en-US"/>
           </a:p>
@@ -2303,7 +2302,7 @@
           <a:p>
             <a:fld id="{289436DB-F1B6-4655-9920-C66902317381}" type="datetimeFigureOut">
               <a:rPr lang="en-US" smtClean="0"/>
-              <a:t>1/10/2011</a:t>
+              <a:t>1/11/2011</a:t>
             </a:fld>
             <a:endParaRPr lang="en-US"/>
           </a:p>
@@ -2556,7 +2555,7 @@
           <a:p>
             <a:fld id="{289436DB-F1B6-4655-9920-C66902317381}" type="datetimeFigureOut">
               <a:rPr lang="en-US" smtClean="0"/>
-              <a:t>1/10/2011</a:t>
+              <a:t>1/11/2011</a:t>
             </a:fld>
             <a:endParaRPr lang="en-US"/>
           </a:p>
@@ -2769,7 +2768,7 @@
           <a:p>
             <a:fld id="{289436DB-F1B6-4655-9920-C66902317381}" type="datetimeFigureOut">
               <a:rPr lang="en-US" smtClean="0"/>
-              <a:t>1/10/2011</a:t>
+              <a:t>1/11/2011</a:t>
             </a:fld>
             <a:endParaRPr lang="en-US"/>
           </a:p>
@@ -3217,6 +3216,13 @@
   <p:clrMapOvr>
     <a:masterClrMapping/>
   </p:clrMapOvr>
+  <p:timing>
+    <p:tnLst>
+      <p:par>
+        <p:cTn id="1" dur="indefinite" restart="never" nodeType="tmRoot"/>
+      </p:par>
+    </p:tnLst>
+  </p:timing>
 </p:sld>
 </file>
 
@@ -3315,6 +3321,13 @@
   <p:clrMapOvr>
     <a:masterClrMapping/>
   </p:clrMapOvr>
+  <p:timing>
+    <p:tnLst>
+      <p:par>
+        <p:cTn id="1" dur="indefinite" restart="never" nodeType="tmRoot"/>
+      </p:par>
+    </p:tnLst>
+  </p:timing>
 </p:sld>
 </file>
 
@@ -5800,6 +5813,13 @@
   <p:clrMapOvr>
     <a:masterClrMapping/>
   </p:clrMapOvr>
+  <p:timing>
+    <p:tnLst>
+      <p:par>
+        <p:cTn id="1" dur="indefinite" restart="never" nodeType="tmRoot"/>
+      </p:par>
+    </p:tnLst>
+  </p:timing>
 </p:sld>
 </file>
 
@@ -6535,6 +6555,13 @@
   <p:clrMapOvr>
     <a:masterClrMapping/>
   </p:clrMapOvr>
+  <p:timing>
+    <p:tnLst>
+      <p:par>
+        <p:cTn id="1" dur="indefinite" restart="never" nodeType="tmRoot"/>
+      </p:par>
+    </p:tnLst>
+  </p:timing>
 </p:sld>
 </file>
 
@@ -7288,6 +7315,13 @@
   <p:clrMapOvr>
     <a:masterClrMapping/>
   </p:clrMapOvr>
+  <p:timing>
+    <p:tnLst>
+      <p:par>
+        <p:cTn id="1" dur="indefinite" restart="never" nodeType="tmRoot"/>
+      </p:par>
+    </p:tnLst>
+  </p:timing>
 </p:sld>
 </file>
 
@@ -8037,6 +8071,13 @@
   <p:clrMapOvr>
     <a:masterClrMapping/>
   </p:clrMapOvr>
+  <p:timing>
+    <p:tnLst>
+      <p:par>
+        <p:cTn id="1" dur="indefinite" restart="never" nodeType="tmRoot"/>
+      </p:par>
+    </p:tnLst>
+  </p:timing>
 </p:sld>
 </file>
 
@@ -8127,6 +8168,13 @@
   <p:clrMapOvr>
     <a:masterClrMapping/>
   </p:clrMapOvr>
+  <p:timing>
+    <p:tnLst>
+      <p:par>
+        <p:cTn id="1" dur="indefinite" restart="never" nodeType="tmRoot"/>
+      </p:par>
+    </p:tnLst>
+  </p:timing>
 </p:sld>
 </file>
 
@@ -9933,12 +9981,6 @@
               </a:rPr>
               <a:t> x);</a:t>
             </a:r>
-            <a:endParaRPr lang="en-US" sz="2200" dirty="0">
-              <a:solidFill>
-                <a:prstClr val="black"/>
-              </a:solidFill>
-              <a:latin typeface="Consolas"/>
-            </a:endParaRPr>
           </a:p>
         </p:txBody>
       </p:sp>
@@ -9952,6 +9994,13 @@
   <p:clrMapOvr>
     <a:masterClrMapping/>
   </p:clrMapOvr>
+  <p:timing>
+    <p:tnLst>
+      <p:par>
+        <p:cTn id="1" dur="indefinite" restart="never" nodeType="tmRoot"/>
+      </p:par>
+    </p:tnLst>
+  </p:timing>
 </p:sld>
 </file>
 
@@ -10143,12 +10192,6 @@
               </a:rPr>
               <a:t> x);</a:t>
             </a:r>
-            <a:endParaRPr lang="en-US" sz="2200" dirty="0">
-              <a:solidFill>
-                <a:prstClr val="black"/>
-              </a:solidFill>
-              <a:latin typeface="Consolas"/>
-            </a:endParaRPr>
           </a:p>
         </p:txBody>
       </p:sp>
@@ -10254,12 +10297,6 @@
               </a:rPr>
               <a:t>x);</a:t>
             </a:r>
-            <a:endParaRPr lang="en-US" sz="2200" dirty="0">
-              <a:solidFill>
-                <a:prstClr val="black"/>
-              </a:solidFill>
-              <a:latin typeface="Consolas"/>
-            </a:endParaRPr>
           </a:p>
         </p:txBody>
       </p:sp>
@@ -10273,6 +10310,13 @@
   <p:clrMapOvr>
     <a:masterClrMapping/>
   </p:clrMapOvr>
+  <p:timing>
+    <p:tnLst>
+      <p:par>
+        <p:cTn id="1" dur="indefinite" restart="never" nodeType="tmRoot"/>
+      </p:par>
+    </p:tnLst>
+  </p:timing>
 </p:sld>
 </file>
 
@@ -10474,12 +10518,6 @@
               </a:rPr>
               <a:t> x);</a:t>
             </a:r>
-            <a:endParaRPr lang="en-US" sz="2200" dirty="0">
-              <a:solidFill>
-                <a:prstClr val="black"/>
-              </a:solidFill>
-              <a:latin typeface="Consolas"/>
-            </a:endParaRPr>
           </a:p>
         </p:txBody>
       </p:sp>
@@ -10585,12 +10623,6 @@
               </a:rPr>
               <a:t>x);</a:t>
             </a:r>
-            <a:endParaRPr lang="en-US" sz="2200" dirty="0">
-              <a:solidFill>
-                <a:prstClr val="black"/>
-              </a:solidFill>
-              <a:latin typeface="Consolas"/>
-            </a:endParaRPr>
           </a:p>
         </p:txBody>
       </p:sp>
@@ -10696,12 +10728,6 @@
               </a:rPr>
               <a:t>x);</a:t>
             </a:r>
-            <a:endParaRPr lang="en-US" sz="2200" dirty="0">
-              <a:solidFill>
-                <a:prstClr val="black"/>
-              </a:solidFill>
-              <a:latin typeface="Consolas"/>
-            </a:endParaRPr>
           </a:p>
         </p:txBody>
       </p:sp>
@@ -10715,6 +10741,13 @@
   <p:clrMapOvr>
     <a:masterClrMapping/>
   </p:clrMapOvr>
+  <p:timing>
+    <p:tnLst>
+      <p:par>
+        <p:cTn id="1" dur="indefinite" restart="never" nodeType="tmRoot"/>
+      </p:par>
+    </p:tnLst>
+  </p:timing>
 </p:sld>
 </file>
 
@@ -10866,7 +10899,16 @@
                 </a:solidFill>
                 <a:latin typeface="Consolas"/>
               </a:rPr>
-              <a:t>T arg1);</a:t>
+              <a:t>T1 </a:t>
+            </a:r>
+            <a:r>
+              <a:rPr lang="en-US" sz="2400" dirty="0" smtClean="0">
+                <a:solidFill>
+                  <a:prstClr val="black"/>
+                </a:solidFill>
+                <a:latin typeface="Consolas"/>
+              </a:rPr>
+              <a:t>arg1);</a:t>
             </a:r>
           </a:p>
           <a:p>
@@ -11104,6 +11146,13 @@
   <p:clrMapOvr>
     <a:masterClrMapping/>
   </p:clrMapOvr>
+  <p:timing>
+    <p:tnLst>
+      <p:par>
+        <p:cTn id="1" dur="indefinite" restart="never" nodeType="tmRoot"/>
+      </p:par>
+    </p:tnLst>
+  </p:timing>
 </p:sld>
 </file>
 
@@ -11500,6 +11549,13 @@
   <p:clrMapOvr>
     <a:masterClrMapping/>
   </p:clrMapOvr>
+  <p:timing>
+    <p:tnLst>
+      <p:par>
+        <p:cTn id="1" dur="indefinite" restart="never" nodeType="tmRoot"/>
+      </p:par>
+    </p:tnLst>
+  </p:timing>
 </p:sld>
 </file>
 
@@ -12097,6 +12153,13 @@
   <p:clrMapOvr>
     <a:masterClrMapping/>
   </p:clrMapOvr>
+  <p:timing>
+    <p:tnLst>
+      <p:par>
+        <p:cTn id="1" dur="indefinite" restart="never" nodeType="tmRoot"/>
+      </p:par>
+    </p:tnLst>
+  </p:timing>
 </p:sld>
 </file>
 
@@ -13251,12 +13314,6 @@
               </a:rPr>
               <a:t> v &gt; 0; }</a:t>
             </a:r>
-            <a:endParaRPr lang="en-US" sz="2200" dirty="0">
-              <a:solidFill>
-                <a:prstClr val="black"/>
-              </a:solidFill>
-              <a:latin typeface="Consolas"/>
-            </a:endParaRPr>
           </a:p>
         </p:txBody>
       </p:sp>
@@ -13411,6 +13468,13 @@
   <p:clrMapOvr>
     <a:masterClrMapping/>
   </p:clrMapOvr>
+  <p:timing>
+    <p:tnLst>
+      <p:par>
+        <p:cTn id="1" dur="indefinite" restart="never" nodeType="tmRoot"/>
+      </p:par>
+    </p:tnLst>
+  </p:timing>
 </p:sld>
 </file>
 
@@ -14177,6 +14241,13 @@
   <p:clrMapOvr>
     <a:masterClrMapping/>
   </p:clrMapOvr>
+  <p:timing>
+    <p:tnLst>
+      <p:par>
+        <p:cTn id="1" dur="indefinite" restart="never" nodeType="tmRoot"/>
+      </p:par>
+    </p:tnLst>
+  </p:timing>
 </p:sld>
 </file>
 
@@ -14880,6 +14951,13 @@
   <p:clrMapOvr>
     <a:masterClrMapping/>
   </p:clrMapOvr>
+  <p:timing>
+    <p:tnLst>
+      <p:par>
+        <p:cTn id="1" dur="indefinite" restart="never" nodeType="tmRoot"/>
+      </p:par>
+    </p:tnLst>
+  </p:timing>
 </p:sld>
 </file>
 
@@ -15640,6 +15718,13 @@
   <p:clrMapOvr>
     <a:masterClrMapping/>
   </p:clrMapOvr>
+  <p:timing>
+    <p:tnLst>
+      <p:par>
+        <p:cTn id="1" dur="indefinite" restart="never" nodeType="tmRoot"/>
+      </p:par>
+    </p:tnLst>
+  </p:timing>
 </p:sld>
 </file>
 
@@ -15773,6 +15858,13 @@
   <p:clrMapOvr>
     <a:masterClrMapping/>
   </p:clrMapOvr>
+  <p:timing>
+    <p:tnLst>
+      <p:par>
+        <p:cTn id="1" dur="indefinite" restart="never" nodeType="tmRoot"/>
+      </p:par>
+    </p:tnLst>
+  </p:timing>
 </p:sld>
 </file>
 
@@ -15861,7 +15953,6 @@
               <a:rPr lang="en-US" dirty="0"/>
               <a:t>[])</a:t>
             </a:r>
-            <a:endParaRPr lang="en-US" dirty="0"/>
           </a:p>
         </p:txBody>
       </p:sp>
@@ -16346,6 +16437,13 @@
   <p:clrMapOvr>
     <a:masterClrMapping/>
   </p:clrMapOvr>
+  <p:timing>
+    <p:tnLst>
+      <p:par>
+        <p:cTn id="1" dur="indefinite" restart="never" nodeType="tmRoot"/>
+      </p:par>
+    </p:tnLst>
+  </p:timing>
 </p:sld>
 </file>
 
@@ -16779,6 +16877,13 @@
   <p:clrMapOvr>
     <a:masterClrMapping/>
   </p:clrMapOvr>
+  <p:timing>
+    <p:tnLst>
+      <p:par>
+        <p:cTn id="1" dur="indefinite" restart="never" nodeType="tmRoot"/>
+      </p:par>
+    </p:tnLst>
+  </p:timing>
 </p:sld>
 </file>
 
@@ -17240,6 +17345,13 @@
   <p:clrMapOvr>
     <a:masterClrMapping/>
   </p:clrMapOvr>
+  <p:timing>
+    <p:tnLst>
+      <p:par>
+        <p:cTn id="1" dur="indefinite" restart="never" nodeType="tmRoot"/>
+      </p:par>
+    </p:tnLst>
+  </p:timing>
 </p:sld>
 </file>
 
@@ -17665,6 +17777,13 @@
   <p:clrMapOvr>
     <a:masterClrMapping/>
   </p:clrMapOvr>
+  <p:timing>
+    <p:tnLst>
+      <p:par>
+        <p:cTn id="1" dur="indefinite" restart="never" nodeType="tmRoot"/>
+      </p:par>
+    </p:tnLst>
+  </p:timing>
 </p:sld>
 </file>
 
@@ -18220,6 +18339,13 @@
   <p:clrMapOvr>
     <a:masterClrMapping/>
   </p:clrMapOvr>
+  <p:timing>
+    <p:tnLst>
+      <p:par>
+        <p:cTn id="1" dur="indefinite" restart="never" nodeType="tmRoot"/>
+      </p:par>
+    </p:tnLst>
+  </p:timing>
 </p:sld>
 </file>
 
@@ -18242,6 +18368,503 @@
       </p:grpSpPr>
       <p:sp>
         <p:nvSpPr>
+          <p:cNvPr id="9" name="Rectangle 8"/>
+          <p:cNvSpPr/>
+          <p:nvPr/>
+        </p:nvSpPr>
+        <p:spPr>
+          <a:xfrm>
+            <a:off x="0" y="1295400"/>
+            <a:ext cx="9144000" cy="4154984"/>
+          </a:xfrm>
+          <a:prstGeom prst="rect">
+            <a:avLst/>
+          </a:prstGeom>
+        </p:spPr>
+        <p:txBody>
+          <a:bodyPr wrap="square">
+            <a:spAutoFit/>
+          </a:bodyPr>
+          <a:lstStyle/>
+          <a:p>
+            <a:r>
+              <a:rPr lang="en-US" sz="2400" dirty="0">
+                <a:solidFill>
+                  <a:srgbClr val="0000FF"/>
+                </a:solidFill>
+                <a:latin typeface="Consolas"/>
+              </a:rPr>
+              <a:t>using</a:t>
+            </a:r>
+            <a:r>
+              <a:rPr lang="en-US" sz="2400" dirty="0">
+                <a:solidFill>
+                  <a:prstClr val="black"/>
+                </a:solidFill>
+                <a:latin typeface="Consolas"/>
+              </a:rPr>
+              <a:t> </a:t>
+            </a:r>
+            <a:r>
+              <a:rPr lang="en-US" sz="2400" dirty="0" err="1">
+                <a:solidFill>
+                  <a:prstClr val="black"/>
+                </a:solidFill>
+                <a:latin typeface="Consolas"/>
+              </a:rPr>
+              <a:t>System.Collections.Generic</a:t>
+            </a:r>
+            <a:r>
+              <a:rPr lang="en-US" sz="2400" dirty="0">
+                <a:solidFill>
+                  <a:prstClr val="black"/>
+                </a:solidFill>
+                <a:latin typeface="Consolas"/>
+              </a:rPr>
+              <a:t>;</a:t>
+            </a:r>
+          </a:p>
+          <a:p>
+            <a:r>
+              <a:rPr lang="en-US" sz="2400" dirty="0">
+                <a:solidFill>
+                  <a:srgbClr val="0000FF"/>
+                </a:solidFill>
+                <a:latin typeface="Consolas"/>
+              </a:rPr>
+              <a:t>using</a:t>
+            </a:r>
+            <a:r>
+              <a:rPr lang="en-US" sz="2400" dirty="0">
+                <a:solidFill>
+                  <a:prstClr val="black"/>
+                </a:solidFill>
+                <a:latin typeface="Consolas"/>
+              </a:rPr>
+              <a:t> </a:t>
+            </a:r>
+            <a:r>
+              <a:rPr lang="en-US" sz="2400" dirty="0" err="1">
+                <a:solidFill>
+                  <a:prstClr val="black"/>
+                </a:solidFill>
+                <a:latin typeface="Consolas"/>
+              </a:rPr>
+              <a:t>System.Linq</a:t>
+            </a:r>
+            <a:r>
+              <a:rPr lang="en-US" sz="2400" dirty="0" smtClean="0">
+                <a:solidFill>
+                  <a:prstClr val="black"/>
+                </a:solidFill>
+                <a:latin typeface="Consolas"/>
+              </a:rPr>
+              <a:t>;</a:t>
+            </a:r>
+            <a:endParaRPr lang="en-US" sz="2400" dirty="0" smtClean="0">
+              <a:solidFill>
+                <a:srgbClr val="0000FF"/>
+              </a:solidFill>
+              <a:latin typeface="Consolas"/>
+            </a:endParaRPr>
+          </a:p>
+          <a:p>
+            <a:endParaRPr lang="en-US" sz="2400" dirty="0">
+              <a:solidFill>
+                <a:srgbClr val="0000FF"/>
+              </a:solidFill>
+              <a:latin typeface="Consolas"/>
+            </a:endParaRPr>
+          </a:p>
+          <a:p>
+            <a:r>
+              <a:rPr lang="en-US" sz="2400" dirty="0" smtClean="0">
+                <a:solidFill>
+                  <a:srgbClr val="0000FF"/>
+                </a:solidFill>
+                <a:latin typeface="Consolas"/>
+              </a:rPr>
+              <a:t>static</a:t>
+            </a:r>
+            <a:r>
+              <a:rPr lang="en-US" sz="2400" dirty="0" smtClean="0">
+                <a:solidFill>
+                  <a:prstClr val="black"/>
+                </a:solidFill>
+                <a:latin typeface="Consolas"/>
+              </a:rPr>
+              <a:t> </a:t>
+            </a:r>
+            <a:r>
+              <a:rPr lang="en-US" sz="2400" dirty="0">
+                <a:solidFill>
+                  <a:srgbClr val="0000FF"/>
+                </a:solidFill>
+                <a:latin typeface="Consolas"/>
+              </a:rPr>
+              <a:t>void</a:t>
+            </a:r>
+            <a:r>
+              <a:rPr lang="en-US" sz="2400" dirty="0">
+                <a:solidFill>
+                  <a:prstClr val="black"/>
+                </a:solidFill>
+                <a:latin typeface="Consolas"/>
+              </a:rPr>
+              <a:t> Main(</a:t>
+            </a:r>
+            <a:r>
+              <a:rPr lang="en-US" sz="2400" dirty="0">
+                <a:solidFill>
+                  <a:srgbClr val="0000FF"/>
+                </a:solidFill>
+                <a:latin typeface="Consolas"/>
+              </a:rPr>
+              <a:t>string</a:t>
+            </a:r>
+            <a:r>
+              <a:rPr lang="en-US" sz="2400" dirty="0">
+                <a:solidFill>
+                  <a:prstClr val="black"/>
+                </a:solidFill>
+                <a:latin typeface="Consolas"/>
+              </a:rPr>
+              <a:t>[] </a:t>
+            </a:r>
+            <a:r>
+              <a:rPr lang="en-US" sz="2400" dirty="0" err="1">
+                <a:solidFill>
+                  <a:prstClr val="black"/>
+                </a:solidFill>
+                <a:latin typeface="Consolas"/>
+              </a:rPr>
+              <a:t>args</a:t>
+            </a:r>
+            <a:r>
+              <a:rPr lang="en-US" sz="2400" dirty="0">
+                <a:solidFill>
+                  <a:prstClr val="black"/>
+                </a:solidFill>
+                <a:latin typeface="Consolas"/>
+              </a:rPr>
+              <a:t>)</a:t>
+            </a:r>
+          </a:p>
+          <a:p>
+            <a:r>
+              <a:rPr lang="en-US" sz="2400" dirty="0" smtClean="0">
+                <a:solidFill>
+                  <a:prstClr val="black"/>
+                </a:solidFill>
+                <a:latin typeface="Consolas"/>
+              </a:rPr>
+              <a:t>{</a:t>
+            </a:r>
+            <a:endParaRPr lang="en-US" sz="2400" dirty="0">
+              <a:solidFill>
+                <a:prstClr val="black"/>
+              </a:solidFill>
+              <a:latin typeface="Consolas"/>
+            </a:endParaRPr>
+          </a:p>
+          <a:p>
+            <a:r>
+              <a:rPr lang="en-US" sz="2400" dirty="0" smtClean="0">
+                <a:solidFill>
+                  <a:srgbClr val="0000FF"/>
+                </a:solidFill>
+                <a:latin typeface="Consolas"/>
+              </a:rPr>
+              <a:t>    </a:t>
+            </a:r>
+            <a:r>
+              <a:rPr lang="en-US" sz="2400" dirty="0" err="1" smtClean="0">
+                <a:solidFill>
+                  <a:srgbClr val="0000FF"/>
+                </a:solidFill>
+                <a:latin typeface="Consolas"/>
+              </a:rPr>
+              <a:t>int</a:t>
+            </a:r>
+            <a:r>
+              <a:rPr lang="en-US" sz="2400" dirty="0">
+                <a:solidFill>
+                  <a:prstClr val="black"/>
+                </a:solidFill>
+                <a:latin typeface="Consolas"/>
+              </a:rPr>
+              <a:t>[] </a:t>
+            </a:r>
+            <a:r>
+              <a:rPr lang="en-US" sz="2400" dirty="0" err="1">
+                <a:solidFill>
+                  <a:prstClr val="black"/>
+                </a:solidFill>
+                <a:latin typeface="Consolas"/>
+              </a:rPr>
+              <a:t>arr</a:t>
+            </a:r>
+            <a:r>
+              <a:rPr lang="en-US" sz="2400" dirty="0">
+                <a:solidFill>
+                  <a:prstClr val="black"/>
+                </a:solidFill>
+                <a:latin typeface="Consolas"/>
+              </a:rPr>
+              <a:t> = </a:t>
+            </a:r>
+            <a:r>
+              <a:rPr lang="en-US" sz="2400" dirty="0">
+                <a:solidFill>
+                  <a:srgbClr val="0000FF"/>
+                </a:solidFill>
+                <a:latin typeface="Consolas"/>
+              </a:rPr>
+              <a:t>new</a:t>
+            </a:r>
+            <a:r>
+              <a:rPr lang="en-US" sz="2400" dirty="0">
+                <a:solidFill>
+                  <a:prstClr val="black"/>
+                </a:solidFill>
+                <a:latin typeface="Consolas"/>
+              </a:rPr>
+              <a:t> </a:t>
+            </a:r>
+            <a:r>
+              <a:rPr lang="en-US" sz="2400" dirty="0" err="1">
+                <a:solidFill>
+                  <a:srgbClr val="0000FF"/>
+                </a:solidFill>
+                <a:latin typeface="Consolas"/>
+              </a:rPr>
+              <a:t>int</a:t>
+            </a:r>
+            <a:r>
+              <a:rPr lang="en-US" sz="2400" dirty="0">
+                <a:solidFill>
+                  <a:prstClr val="black"/>
+                </a:solidFill>
+                <a:latin typeface="Consolas"/>
+              </a:rPr>
+              <a:t>[] { 1, -1, 0, 4, -3, 2 };</a:t>
+            </a:r>
+          </a:p>
+          <a:p>
+            <a:r>
+              <a:rPr lang="en-US" sz="2400" dirty="0">
+                <a:solidFill>
+                  <a:prstClr val="black"/>
+                </a:solidFill>
+                <a:latin typeface="Consolas"/>
+              </a:rPr>
+              <a:t>    </a:t>
+            </a:r>
+            <a:r>
+              <a:rPr lang="en-US" sz="2400" dirty="0" err="1" smtClean="0">
+                <a:solidFill>
+                  <a:srgbClr val="2B91AF"/>
+                </a:solidFill>
+                <a:latin typeface="Consolas"/>
+              </a:rPr>
+              <a:t>IEnumerable</a:t>
+            </a:r>
+            <a:r>
+              <a:rPr lang="en-US" sz="2400" dirty="0" smtClean="0">
+                <a:solidFill>
+                  <a:prstClr val="black"/>
+                </a:solidFill>
+                <a:latin typeface="Consolas"/>
+              </a:rPr>
+              <a:t>&lt;</a:t>
+            </a:r>
+            <a:r>
+              <a:rPr lang="en-US" sz="2400" dirty="0" err="1" smtClean="0">
+                <a:solidFill>
+                  <a:srgbClr val="0000FF"/>
+                </a:solidFill>
+                <a:latin typeface="Consolas"/>
+              </a:rPr>
+              <a:t>int</a:t>
+            </a:r>
+            <a:r>
+              <a:rPr lang="en-US" sz="2400" dirty="0">
+                <a:solidFill>
+                  <a:prstClr val="black"/>
+                </a:solidFill>
+                <a:latin typeface="Consolas"/>
+              </a:rPr>
+              <a:t>&gt; query = </a:t>
+            </a:r>
+          </a:p>
+          <a:p>
+            <a:r>
+              <a:rPr lang="en-US" sz="2400" dirty="0">
+                <a:solidFill>
+                  <a:prstClr val="black"/>
+                </a:solidFill>
+                <a:latin typeface="Consolas"/>
+              </a:rPr>
+              <a:t>    </a:t>
+            </a:r>
+            <a:r>
+              <a:rPr lang="en-US" sz="2400" dirty="0" smtClean="0">
+                <a:solidFill>
+                  <a:prstClr val="black"/>
+                </a:solidFill>
+                <a:latin typeface="Consolas"/>
+              </a:rPr>
+              <a:t>    </a:t>
+            </a:r>
+            <a:r>
+              <a:rPr lang="en-US" sz="2400" b="1" dirty="0" err="1" smtClean="0">
+                <a:solidFill>
+                  <a:prstClr val="black"/>
+                </a:solidFill>
+                <a:latin typeface="Consolas"/>
+              </a:rPr>
+              <a:t>arr.Where</a:t>
+            </a:r>
+            <a:r>
+              <a:rPr lang="en-US" sz="2400" dirty="0" smtClean="0">
+                <a:solidFill>
+                  <a:prstClr val="black"/>
+                </a:solidFill>
+                <a:latin typeface="Consolas"/>
+              </a:rPr>
+              <a:t>(v </a:t>
+            </a:r>
+            <a:r>
+              <a:rPr lang="en-US" sz="2400" dirty="0">
+                <a:solidFill>
+                  <a:prstClr val="black"/>
+                </a:solidFill>
+                <a:latin typeface="Consolas"/>
+              </a:rPr>
+              <a:t>=&gt; v &gt; 0);</a:t>
+            </a:r>
+          </a:p>
+          <a:p>
+            <a:r>
+              <a:rPr lang="en-US" sz="2400" dirty="0">
+                <a:solidFill>
+                  <a:prstClr val="black"/>
+                </a:solidFill>
+                <a:latin typeface="Consolas"/>
+              </a:rPr>
+              <a:t>    </a:t>
+            </a:r>
+            <a:r>
+              <a:rPr lang="en-US" sz="2400" dirty="0" err="1" smtClean="0">
+                <a:solidFill>
+                  <a:srgbClr val="0000FF"/>
+                </a:solidFill>
+                <a:latin typeface="Consolas"/>
+              </a:rPr>
+              <a:t>int</a:t>
+            </a:r>
+            <a:r>
+              <a:rPr lang="en-US" sz="2400" dirty="0">
+                <a:solidFill>
+                  <a:prstClr val="black"/>
+                </a:solidFill>
+                <a:latin typeface="Consolas"/>
+              </a:rPr>
+              <a:t>[] </a:t>
+            </a:r>
+            <a:r>
+              <a:rPr lang="en-US" sz="2400" dirty="0" err="1">
+                <a:solidFill>
+                  <a:prstClr val="black"/>
+                </a:solidFill>
+                <a:latin typeface="Consolas"/>
+              </a:rPr>
+              <a:t>positiveArr</a:t>
+            </a:r>
+            <a:r>
+              <a:rPr lang="en-US" sz="2400" dirty="0">
+                <a:solidFill>
+                  <a:prstClr val="black"/>
+                </a:solidFill>
+                <a:latin typeface="Consolas"/>
+              </a:rPr>
+              <a:t> = </a:t>
+            </a:r>
+            <a:r>
+              <a:rPr lang="en-US" sz="2400" dirty="0" err="1">
+                <a:solidFill>
+                  <a:prstClr val="black"/>
+                </a:solidFill>
+                <a:latin typeface="Consolas"/>
+              </a:rPr>
+              <a:t>arr.ToArray</a:t>
+            </a:r>
+            <a:r>
+              <a:rPr lang="en-US" sz="2400" dirty="0" smtClean="0">
+                <a:solidFill>
+                  <a:prstClr val="black"/>
+                </a:solidFill>
+                <a:latin typeface="Consolas"/>
+              </a:rPr>
+              <a:t>();</a:t>
+            </a:r>
+          </a:p>
+          <a:p>
+            <a:r>
+              <a:rPr lang="en-US" sz="2400" dirty="0" smtClean="0">
+                <a:solidFill>
+                  <a:prstClr val="black"/>
+                </a:solidFill>
+                <a:latin typeface="Consolas"/>
+              </a:rPr>
+              <a:t>    </a:t>
+            </a:r>
+            <a:r>
+              <a:rPr lang="en-US" sz="2400" dirty="0">
+                <a:solidFill>
+                  <a:srgbClr val="008000"/>
+                </a:solidFill>
+                <a:latin typeface="Consolas"/>
+              </a:rPr>
+              <a:t>// contains { 1, 4, 2 </a:t>
+            </a:r>
+            <a:r>
+              <a:rPr lang="en-US" sz="2400" dirty="0" smtClean="0">
+                <a:solidFill>
+                  <a:srgbClr val="008000"/>
+                </a:solidFill>
+                <a:latin typeface="Consolas"/>
+              </a:rPr>
+              <a:t>}</a:t>
+            </a:r>
+            <a:endParaRPr lang="en-US" sz="2400" dirty="0" smtClean="0">
+              <a:solidFill>
+                <a:prstClr val="black"/>
+              </a:solidFill>
+              <a:latin typeface="Consolas"/>
+            </a:endParaRPr>
+          </a:p>
+          <a:p>
+            <a:r>
+              <a:rPr lang="en-US" sz="2400" dirty="0" smtClean="0">
+                <a:solidFill>
+                  <a:prstClr val="black"/>
+                </a:solidFill>
+                <a:latin typeface="Consolas"/>
+              </a:rPr>
+              <a:t>}</a:t>
+            </a:r>
+            <a:endParaRPr lang="en-US" sz="2400" dirty="0">
+              <a:solidFill>
+                <a:prstClr val="black"/>
+              </a:solidFill>
+              <a:latin typeface="Consolas"/>
+            </a:endParaRPr>
+          </a:p>
+        </p:txBody>
+      </p:sp>
+      <p:sp>
+        <p:nvSpPr>
           <p:cNvPr id="5" name="Title 1"/>
           <p:cNvSpPr>
             <a:spLocks noGrp="1"/>
@@ -18270,511 +18893,98 @@
       </p:sp>
       <p:sp>
         <p:nvSpPr>
-          <p:cNvPr id="6" name="Rectangle 5"/>
+          <p:cNvPr id="7" name="Up Arrow 6"/>
           <p:cNvSpPr/>
           <p:nvPr/>
         </p:nvSpPr>
         <p:spPr>
           <a:xfrm>
-            <a:off x="0" y="1295400"/>
-            <a:ext cx="9144000" cy="4154984"/>
+            <a:off x="1295400" y="4231184"/>
+            <a:ext cx="1524000" cy="1219200"/>
           </a:xfrm>
-          <a:prstGeom prst="rect">
+          <a:prstGeom prst="upArrow">
             <a:avLst/>
           </a:prstGeom>
         </p:spPr>
+        <p:style>
+          <a:lnRef idx="2">
+            <a:schemeClr val="accent1">
+              <a:shade val="50000"/>
+            </a:schemeClr>
+          </a:lnRef>
+          <a:fillRef idx="1">
+            <a:schemeClr val="accent1"/>
+          </a:fillRef>
+          <a:effectRef idx="0">
+            <a:schemeClr val="accent1"/>
+          </a:effectRef>
+          <a:fontRef idx="minor">
+            <a:schemeClr val="lt1"/>
+          </a:fontRef>
+        </p:style>
         <p:txBody>
-          <a:bodyPr wrap="square">
-            <a:spAutoFit/>
+          <a:bodyPr rtlCol="0" anchor="ctr"/>
+          <a:lstStyle/>
+          <a:p>
+            <a:pPr algn="ctr"/>
+            <a:endParaRPr lang="en-US"/>
+          </a:p>
+        </p:txBody>
+      </p:sp>
+      <p:sp>
+        <p:nvSpPr>
+          <p:cNvPr id="8" name="Content Placeholder 2"/>
+          <p:cNvSpPr>
+            <a:spLocks noGrp="1"/>
+          </p:cNvSpPr>
+          <p:nvPr>
+            <p:ph idx="1"/>
+          </p:nvPr>
+        </p:nvSpPr>
+        <p:spPr>
+          <a:xfrm>
+            <a:off x="0" y="5715000"/>
+            <a:ext cx="9144000" cy="990600"/>
+          </a:xfrm>
+        </p:spPr>
+        <p:txBody>
+          <a:bodyPr>
+            <a:normAutofit fontScale="92500" lnSpcReduction="10000"/>
           </a:bodyPr>
           <a:lstStyle/>
           <a:p>
             <a:r>
-              <a:rPr lang="en-US" sz="2400" dirty="0">
-                <a:solidFill>
-                  <a:srgbClr val="0000FF"/>
-                </a:solidFill>
-                <a:latin typeface="Consolas"/>
-              </a:rPr>
-              <a:t>using</a:t>
-            </a:r>
-            <a:r>
-              <a:rPr lang="en-US" sz="2400" dirty="0">
-                <a:solidFill>
-                  <a:prstClr val="black"/>
-                </a:solidFill>
-                <a:latin typeface="Consolas"/>
-              </a:rPr>
-              <a:t> </a:t>
-            </a:r>
-            <a:r>
-              <a:rPr lang="en-US" sz="2400" dirty="0" err="1">
-                <a:solidFill>
-                  <a:prstClr val="black"/>
-                </a:solidFill>
-                <a:latin typeface="Consolas"/>
-              </a:rPr>
-              <a:t>System.Collections.Generic</a:t>
-            </a:r>
-            <a:r>
-              <a:rPr lang="en-US" sz="2400" dirty="0">
-                <a:solidFill>
-                  <a:prstClr val="black"/>
-                </a:solidFill>
-                <a:latin typeface="Consolas"/>
-              </a:rPr>
-              <a:t>;</a:t>
-            </a:r>
-          </a:p>
-          <a:p>
-            <a:r>
-              <a:rPr lang="en-US" sz="2400" dirty="0">
-                <a:solidFill>
-                  <a:srgbClr val="0000FF"/>
-                </a:solidFill>
-                <a:latin typeface="Consolas"/>
-              </a:rPr>
-              <a:t>using</a:t>
-            </a:r>
-            <a:r>
-              <a:rPr lang="en-US" sz="2400" dirty="0">
-                <a:solidFill>
-                  <a:prstClr val="black"/>
-                </a:solidFill>
-                <a:latin typeface="Consolas"/>
-              </a:rPr>
-              <a:t> </a:t>
-            </a:r>
-            <a:r>
-              <a:rPr lang="en-US" sz="2400" dirty="0" err="1">
-                <a:solidFill>
-                  <a:prstClr val="black"/>
-                </a:solidFill>
-                <a:latin typeface="Consolas"/>
-              </a:rPr>
-              <a:t>System.Linq</a:t>
-            </a:r>
-            <a:r>
-              <a:rPr lang="en-US" sz="2400" dirty="0" smtClean="0">
-                <a:solidFill>
-                  <a:prstClr val="black"/>
-                </a:solidFill>
-                <a:latin typeface="Consolas"/>
-              </a:rPr>
-              <a:t>;</a:t>
-            </a:r>
-            <a:endParaRPr lang="en-US" sz="2400" dirty="0" smtClean="0">
-              <a:solidFill>
-                <a:srgbClr val="0000FF"/>
-              </a:solidFill>
-              <a:latin typeface="Consolas"/>
-            </a:endParaRPr>
-          </a:p>
-          <a:p>
-            <a:endParaRPr lang="en-US" sz="2400" dirty="0">
-              <a:solidFill>
-                <a:srgbClr val="0000FF"/>
-              </a:solidFill>
-              <a:latin typeface="Consolas"/>
-            </a:endParaRPr>
-          </a:p>
-          <a:p>
-            <a:r>
-              <a:rPr lang="en-US" sz="2400" dirty="0" smtClean="0">
-                <a:solidFill>
-                  <a:srgbClr val="0000FF"/>
-                </a:solidFill>
-                <a:latin typeface="Consolas"/>
-              </a:rPr>
-              <a:t>static</a:t>
-            </a:r>
-            <a:r>
-              <a:rPr lang="en-US" sz="2400" dirty="0" smtClean="0">
-                <a:solidFill>
-                  <a:prstClr val="black"/>
-                </a:solidFill>
-                <a:latin typeface="Consolas"/>
-              </a:rPr>
-              <a:t> </a:t>
-            </a:r>
-            <a:r>
-              <a:rPr lang="en-US" sz="2400" dirty="0">
-                <a:solidFill>
-                  <a:srgbClr val="0000FF"/>
-                </a:solidFill>
-                <a:latin typeface="Consolas"/>
-              </a:rPr>
-              <a:t>void</a:t>
-            </a:r>
-            <a:r>
-              <a:rPr lang="en-US" sz="2400" dirty="0">
-                <a:solidFill>
-                  <a:prstClr val="black"/>
-                </a:solidFill>
-                <a:latin typeface="Consolas"/>
-              </a:rPr>
-              <a:t> Main(</a:t>
-            </a:r>
-            <a:r>
-              <a:rPr lang="en-US" sz="2400" dirty="0">
-                <a:solidFill>
-                  <a:srgbClr val="0000FF"/>
-                </a:solidFill>
-                <a:latin typeface="Consolas"/>
-              </a:rPr>
-              <a:t>string</a:t>
-            </a:r>
-            <a:r>
-              <a:rPr lang="en-US" sz="2400" dirty="0">
-                <a:solidFill>
-                  <a:prstClr val="black"/>
-                </a:solidFill>
-                <a:latin typeface="Consolas"/>
-              </a:rPr>
-              <a:t>[] </a:t>
-            </a:r>
-            <a:r>
-              <a:rPr lang="en-US" sz="2400" dirty="0" err="1">
-                <a:solidFill>
-                  <a:prstClr val="black"/>
-                </a:solidFill>
-                <a:latin typeface="Consolas"/>
-              </a:rPr>
-              <a:t>args</a:t>
-            </a:r>
-            <a:r>
-              <a:rPr lang="en-US" sz="2400" dirty="0">
-                <a:solidFill>
-                  <a:prstClr val="black"/>
-                </a:solidFill>
-                <a:latin typeface="Consolas"/>
-              </a:rPr>
-              <a:t>)</a:t>
-            </a:r>
-          </a:p>
-          <a:p>
-            <a:r>
-              <a:rPr lang="en-US" sz="2400" dirty="0" smtClean="0">
-                <a:solidFill>
-                  <a:prstClr val="black"/>
-                </a:solidFill>
-                <a:latin typeface="Consolas"/>
-              </a:rPr>
-              <a:t>{</a:t>
-            </a:r>
-            <a:endParaRPr lang="en-US" sz="2400" dirty="0">
-              <a:solidFill>
-                <a:prstClr val="black"/>
-              </a:solidFill>
-              <a:latin typeface="Consolas"/>
-            </a:endParaRPr>
-          </a:p>
-          <a:p>
-            <a:r>
-              <a:rPr lang="en-US" sz="2400" dirty="0" smtClean="0">
-                <a:solidFill>
-                  <a:srgbClr val="0000FF"/>
-                </a:solidFill>
-                <a:latin typeface="Consolas"/>
-              </a:rPr>
-              <a:t>    </a:t>
-            </a:r>
-            <a:r>
-              <a:rPr lang="en-US" sz="2400" dirty="0" err="1" smtClean="0">
-                <a:solidFill>
-                  <a:srgbClr val="0000FF"/>
-                </a:solidFill>
-                <a:latin typeface="Consolas"/>
-              </a:rPr>
-              <a:t>int</a:t>
-            </a:r>
-            <a:r>
-              <a:rPr lang="en-US" sz="2400" dirty="0">
-                <a:solidFill>
-                  <a:prstClr val="black"/>
-                </a:solidFill>
-                <a:latin typeface="Consolas"/>
-              </a:rPr>
-              <a:t>[] </a:t>
-            </a:r>
-            <a:r>
-              <a:rPr lang="en-US" sz="2400" dirty="0" err="1">
-                <a:solidFill>
-                  <a:prstClr val="black"/>
-                </a:solidFill>
-                <a:latin typeface="Consolas"/>
-              </a:rPr>
-              <a:t>arr</a:t>
-            </a:r>
-            <a:r>
-              <a:rPr lang="en-US" sz="2400" dirty="0">
-                <a:solidFill>
-                  <a:prstClr val="black"/>
-                </a:solidFill>
-                <a:latin typeface="Consolas"/>
-              </a:rPr>
-              <a:t> = </a:t>
-            </a:r>
-            <a:r>
-              <a:rPr lang="en-US" sz="2400" dirty="0">
-                <a:solidFill>
-                  <a:srgbClr val="0000FF"/>
-                </a:solidFill>
-                <a:latin typeface="Consolas"/>
-              </a:rPr>
-              <a:t>new</a:t>
-            </a:r>
-            <a:r>
-              <a:rPr lang="en-US" sz="2400" dirty="0">
-                <a:solidFill>
-                  <a:prstClr val="black"/>
-                </a:solidFill>
-                <a:latin typeface="Consolas"/>
-              </a:rPr>
-              <a:t> </a:t>
-            </a:r>
-            <a:r>
-              <a:rPr lang="en-US" sz="2400" dirty="0" err="1">
-                <a:solidFill>
-                  <a:srgbClr val="0000FF"/>
-                </a:solidFill>
-                <a:latin typeface="Consolas"/>
-              </a:rPr>
-              <a:t>int</a:t>
-            </a:r>
-            <a:r>
-              <a:rPr lang="en-US" sz="2400" dirty="0">
-                <a:solidFill>
-                  <a:prstClr val="black"/>
-                </a:solidFill>
-                <a:latin typeface="Consolas"/>
-              </a:rPr>
-              <a:t>[] { 1, -1, 0, 4, -3, 2 };</a:t>
-            </a:r>
-          </a:p>
-          <a:p>
-            <a:r>
-              <a:rPr lang="en-US" sz="2400" dirty="0">
-                <a:solidFill>
-                  <a:prstClr val="black"/>
-                </a:solidFill>
-                <a:latin typeface="Consolas"/>
-              </a:rPr>
-              <a:t>    </a:t>
-            </a:r>
-            <a:r>
-              <a:rPr lang="en-US" sz="2400" dirty="0" err="1" smtClean="0">
-                <a:solidFill>
-                  <a:srgbClr val="2B91AF"/>
-                </a:solidFill>
-                <a:latin typeface="Consolas"/>
-              </a:rPr>
+              <a:rPr lang="en-US" dirty="0" smtClean="0"/>
+              <a:t>Extension methods (like Where, for </a:t>
+            </a:r>
+            <a:r>
+              <a:rPr lang="en-US" dirty="0" err="1" smtClean="0"/>
               <a:t>IEnumerable</a:t>
             </a:r>
             <a:r>
-              <a:rPr lang="en-US" sz="2400" dirty="0" smtClean="0">
-                <a:solidFill>
-                  <a:prstClr val="black"/>
-                </a:solidFill>
-                <a:latin typeface="Consolas"/>
-              </a:rPr>
-              <a:t>&lt;</a:t>
-            </a:r>
-            <a:r>
-              <a:rPr lang="en-US" sz="2400" dirty="0" err="1" smtClean="0">
-                <a:solidFill>
-                  <a:srgbClr val="0000FF"/>
-                </a:solidFill>
-                <a:latin typeface="Consolas"/>
-              </a:rPr>
-              <a:t>int</a:t>
-            </a:r>
-            <a:r>
-              <a:rPr lang="en-US" sz="2400" dirty="0">
-                <a:solidFill>
-                  <a:prstClr val="black"/>
-                </a:solidFill>
-                <a:latin typeface="Consolas"/>
-              </a:rPr>
-              <a:t>&gt; query = </a:t>
-            </a:r>
-          </a:p>
-          <a:p>
-            <a:r>
-              <a:rPr lang="en-US" sz="2400" dirty="0">
-                <a:solidFill>
-                  <a:prstClr val="black"/>
-                </a:solidFill>
-                <a:latin typeface="Consolas"/>
-              </a:rPr>
-              <a:t>    </a:t>
-            </a:r>
-            <a:r>
-              <a:rPr lang="en-US" sz="2400" dirty="0" smtClean="0">
-                <a:solidFill>
-                  <a:prstClr val="black"/>
-                </a:solidFill>
-                <a:latin typeface="Consolas"/>
-              </a:rPr>
-              <a:t>    </a:t>
-            </a:r>
-            <a:r>
-              <a:rPr lang="en-US" sz="2400" dirty="0" err="1" smtClean="0">
-                <a:solidFill>
-                  <a:prstClr val="black"/>
-                </a:solidFill>
-                <a:latin typeface="Consolas"/>
-              </a:rPr>
-              <a:t>arr.Where</a:t>
-            </a:r>
-            <a:r>
-              <a:rPr lang="en-US" sz="2400" dirty="0" smtClean="0">
-                <a:solidFill>
-                  <a:prstClr val="black"/>
-                </a:solidFill>
-                <a:latin typeface="Consolas"/>
-              </a:rPr>
-              <a:t>(v </a:t>
-            </a:r>
-            <a:r>
-              <a:rPr lang="en-US" sz="2400" dirty="0">
-                <a:solidFill>
-                  <a:prstClr val="black"/>
-                </a:solidFill>
-                <a:latin typeface="Consolas"/>
-              </a:rPr>
-              <a:t>=&gt; v &gt; 0);</a:t>
-            </a:r>
-          </a:p>
-          <a:p>
-            <a:r>
-              <a:rPr lang="en-US" sz="2400" dirty="0">
-                <a:solidFill>
-                  <a:prstClr val="black"/>
-                </a:solidFill>
-                <a:latin typeface="Consolas"/>
-              </a:rPr>
-              <a:t>    </a:t>
-            </a:r>
-            <a:r>
-              <a:rPr lang="en-US" sz="2400" dirty="0" err="1" smtClean="0">
-                <a:solidFill>
-                  <a:srgbClr val="0000FF"/>
-                </a:solidFill>
-                <a:latin typeface="Consolas"/>
-              </a:rPr>
-              <a:t>int</a:t>
-            </a:r>
-            <a:r>
-              <a:rPr lang="en-US" sz="2400" dirty="0">
-                <a:solidFill>
-                  <a:prstClr val="black"/>
-                </a:solidFill>
-                <a:latin typeface="Consolas"/>
-              </a:rPr>
-              <a:t>[] </a:t>
-            </a:r>
-            <a:r>
-              <a:rPr lang="en-US" sz="2400" dirty="0" err="1">
-                <a:solidFill>
-                  <a:prstClr val="black"/>
-                </a:solidFill>
-                <a:latin typeface="Consolas"/>
-              </a:rPr>
-              <a:t>positiveArr</a:t>
-            </a:r>
-            <a:r>
-              <a:rPr lang="en-US" sz="2400" dirty="0">
-                <a:solidFill>
-                  <a:prstClr val="black"/>
-                </a:solidFill>
-                <a:latin typeface="Consolas"/>
-              </a:rPr>
-              <a:t> = </a:t>
-            </a:r>
-            <a:r>
-              <a:rPr lang="en-US" sz="2400" dirty="0" err="1">
-                <a:solidFill>
-                  <a:prstClr val="black"/>
-                </a:solidFill>
-                <a:latin typeface="Consolas"/>
-              </a:rPr>
-              <a:t>arr.ToArray</a:t>
-            </a:r>
-            <a:r>
-              <a:rPr lang="en-US" sz="2400" dirty="0" smtClean="0">
-                <a:solidFill>
-                  <a:prstClr val="black"/>
-                </a:solidFill>
-                <a:latin typeface="Consolas"/>
-              </a:rPr>
-              <a:t>();</a:t>
-            </a:r>
-          </a:p>
-          <a:p>
-            <a:r>
-              <a:rPr lang="en-US" sz="2400" dirty="0" smtClean="0">
-                <a:solidFill>
-                  <a:prstClr val="black"/>
-                </a:solidFill>
-                <a:latin typeface="Consolas"/>
-              </a:rPr>
-              <a:t>    </a:t>
-            </a:r>
-            <a:r>
-              <a:rPr lang="en-US" sz="2400" dirty="0">
-                <a:solidFill>
-                  <a:srgbClr val="008000"/>
-                </a:solidFill>
-                <a:latin typeface="Consolas"/>
-              </a:rPr>
-              <a:t>// contains { 1, 4, 2 </a:t>
-            </a:r>
-            <a:r>
-              <a:rPr lang="en-US" sz="2400" dirty="0" smtClean="0">
-                <a:solidFill>
-                  <a:srgbClr val="008000"/>
-                </a:solidFill>
-                <a:latin typeface="Consolas"/>
-              </a:rPr>
-              <a:t>}</a:t>
-            </a:r>
-            <a:endParaRPr lang="en-US" sz="2400" dirty="0" smtClean="0">
-              <a:solidFill>
-                <a:prstClr val="black"/>
-              </a:solidFill>
-              <a:latin typeface="Consolas"/>
-            </a:endParaRPr>
-          </a:p>
-          <a:p>
-            <a:r>
-              <a:rPr lang="en-US" sz="2400" dirty="0" smtClean="0">
-                <a:solidFill>
-                  <a:prstClr val="black"/>
-                </a:solidFill>
-                <a:latin typeface="Consolas"/>
-              </a:rPr>
-              <a:t>}</a:t>
-            </a:r>
-            <a:endParaRPr lang="en-US" sz="2400" dirty="0">
-              <a:solidFill>
-                <a:prstClr val="black"/>
-              </a:solidFill>
-              <a:latin typeface="Consolas"/>
-            </a:endParaRPr>
+              <a:rPr lang="en-US" dirty="0" smtClean="0"/>
+              <a:t>) can be invoked with same syntax as instance methods</a:t>
+            </a:r>
           </a:p>
         </p:txBody>
       </p:sp>
     </p:spTree>
     <p:extLst>
       <p:ext uri="{BB962C8B-B14F-4D97-AF65-F5344CB8AC3E}">
-        <p14:creationId xmlns:p14="http://schemas.microsoft.com/office/powerpoint/2010/main" val="1512012973"/>
+        <p14:creationId xmlns:p14="http://schemas.microsoft.com/office/powerpoint/2010/main" val="3100440834"/>
       </p:ext>
     </p:extLst>
   </p:cSld>
   <p:clrMapOvr>
     <a:masterClrMapping/>
   </p:clrMapOvr>
+  <p:timing>
+    <p:tnLst>
+      <p:par>
+        <p:cTn id="1" dur="indefinite" restart="never" nodeType="tmRoot"/>
+      </p:par>
+    </p:tnLst>
+  </p:timing>
 </p:sld>
 </file>
 
@@ -18855,7 +19065,7 @@
           </a:p>
           <a:p>
             <a:r>
-              <a:rPr lang="en-US" sz="2400" dirty="0">
+              <a:rPr lang="en-US" sz="2400" b="1" dirty="0">
                 <a:solidFill>
                   <a:srgbClr val="0000FF"/>
                 </a:solidFill>
@@ -18864,7 +19074,7 @@
               <a:t>using</a:t>
             </a:r>
             <a:r>
-              <a:rPr lang="en-US" sz="2400" dirty="0">
+              <a:rPr lang="en-US" sz="2400" b="1" dirty="0">
                 <a:solidFill>
                   <a:prstClr val="black"/>
                 </a:solidFill>
@@ -18873,7 +19083,7 @@
               <a:t> </a:t>
             </a:r>
             <a:r>
-              <a:rPr lang="en-US" sz="2400" dirty="0" err="1">
+              <a:rPr lang="en-US" sz="2400" b="1" dirty="0" err="1">
                 <a:solidFill>
                   <a:prstClr val="black"/>
                 </a:solidFill>
@@ -18882,7 +19092,7 @@
               <a:t>System.Linq</a:t>
             </a:r>
             <a:r>
-              <a:rPr lang="en-US" sz="2400" dirty="0" smtClean="0">
+              <a:rPr lang="en-US" sz="2400" b="1" dirty="0" smtClean="0">
                 <a:solidFill>
                   <a:prstClr val="black"/>
                 </a:solidFill>
@@ -18890,7 +19100,7 @@
               </a:rPr>
               <a:t>;</a:t>
             </a:r>
-            <a:endParaRPr lang="en-US" sz="2400" dirty="0" smtClean="0">
+            <a:endParaRPr lang="en-US" sz="2400" b="1" dirty="0" smtClean="0">
               <a:solidFill>
                 <a:srgbClr val="0000FF"/>
               </a:solidFill>
@@ -19220,7 +19430,7 @@
               <a:t> = </a:t>
             </a:r>
             <a:r>
-              <a:rPr lang="en-US" sz="2400" dirty="0" err="1">
+              <a:rPr lang="en-US" sz="2400" b="1" dirty="0" err="1">
                 <a:solidFill>
                   <a:prstClr val="black"/>
                 </a:solidFill>
@@ -19328,8 +19538,8 @@
         </p:nvSpPr>
         <p:spPr>
           <a:xfrm>
-            <a:off x="1295400" y="4231184"/>
-            <a:ext cx="1524000" cy="1219200"/>
+            <a:off x="4343400" y="4572000"/>
+            <a:ext cx="1524000" cy="990600"/>
           </a:xfrm>
           <a:prstGeom prst="upArrow">
             <a:avLst/>
@@ -19378,13 +19588,25 @@
         </p:spPr>
         <p:txBody>
           <a:bodyPr>
-            <a:normAutofit fontScale="92500" lnSpcReduction="10000"/>
+            <a:normAutofit lnSpcReduction="10000"/>
           </a:bodyPr>
           <a:lstStyle/>
           <a:p>
             <a:r>
+              <a:rPr lang="en-US" b="1" dirty="0" err="1" smtClean="0"/>
+              <a:t>ToArray</a:t>
+            </a:r>
+            <a:r>
               <a:rPr lang="en-US" dirty="0" smtClean="0"/>
-              <a:t>Extension methods (like Where, for </a:t>
+              <a:t>, like </a:t>
+            </a:r>
+            <a:r>
+              <a:rPr lang="en-US" b="1" dirty="0" smtClean="0"/>
+              <a:t>Where</a:t>
+            </a:r>
+            <a:r>
+              <a:rPr lang="en-US" dirty="0" smtClean="0"/>
+              <a:t>, is also an extension method for </a:t>
             </a:r>
             <a:r>
               <a:rPr lang="en-US" dirty="0" err="1" smtClean="0"/>
@@ -19392,21 +19614,85 @@
             </a:r>
             <a:r>
               <a:rPr lang="en-US" dirty="0" smtClean="0"/>
-              <a:t>) can be invoked with same syntax as instance methods</a:t>
-            </a:r>
+              <a:t>. Both are defined in </a:t>
+            </a:r>
+            <a:r>
+              <a:rPr lang="en-US" b="1" dirty="0" err="1" smtClean="0"/>
+              <a:t>System.Linq</a:t>
+            </a:r>
+            <a:endParaRPr lang="en-US" b="1" dirty="0" smtClean="0"/>
+          </a:p>
+        </p:txBody>
+      </p:sp>
+      <p:sp>
+        <p:nvSpPr>
+          <p:cNvPr id="3" name="Left Arrow 2"/>
+          <p:cNvSpPr/>
+          <p:nvPr/>
+        </p:nvSpPr>
+        <p:spPr>
+          <a:xfrm>
+            <a:off x="3200400" y="1600200"/>
+            <a:ext cx="5943600" cy="609600"/>
+          </a:xfrm>
+          <a:prstGeom prst="leftArrow">
+            <a:avLst/>
+          </a:prstGeom>
+        </p:spPr>
+        <p:style>
+          <a:lnRef idx="2">
+            <a:schemeClr val="accent1">
+              <a:shade val="50000"/>
+            </a:schemeClr>
+          </a:lnRef>
+          <a:fillRef idx="1">
+            <a:schemeClr val="accent1"/>
+          </a:fillRef>
+          <a:effectRef idx="0">
+            <a:schemeClr val="accent1"/>
+          </a:effectRef>
+          <a:fontRef idx="minor">
+            <a:schemeClr val="lt1"/>
+          </a:fontRef>
+        </p:style>
+        <p:txBody>
+          <a:bodyPr rtlCol="0" anchor="ctr"/>
+          <a:lstStyle/>
+          <a:p>
+            <a:pPr algn="ctr"/>
+            <a:r>
+              <a:rPr lang="en-US" dirty="0" smtClean="0"/>
+              <a:t>Need this, otherwise Where and </a:t>
+            </a:r>
+            <a:r>
+              <a:rPr lang="en-US" dirty="0" err="1" smtClean="0"/>
+              <a:t>ToArray</a:t>
+            </a:r>
+            <a:r>
+              <a:rPr lang="en-US" dirty="0" smtClean="0"/>
+              <a:t> won’t be defined</a:t>
+            </a:r>
+            <a:endParaRPr lang="en-US" dirty="0"/>
           </a:p>
         </p:txBody>
       </p:sp>
     </p:spTree>
     <p:extLst>
       <p:ext uri="{BB962C8B-B14F-4D97-AF65-F5344CB8AC3E}">
-        <p14:creationId xmlns:p14="http://schemas.microsoft.com/office/powerpoint/2010/main" val="3100440834"/>
+        <p14:creationId xmlns:p14="http://schemas.microsoft.com/office/powerpoint/2010/main" val="899602899"/>
       </p:ext>
     </p:extLst>
   </p:cSld>
   <p:clrMapOvr>
     <a:masterClrMapping/>
   </p:clrMapOvr>
+  <p:timing>
+    <p:tnLst>
+      <p:par>
+        <p:cTn id="1" dur="indefinite" restart="never" nodeType="tmRoot"/>
+      </p:par>
+    </p:tnLst>
+  </p:timing>
 </p:sld>
 </file>
 
@@ -20226,6 +20512,13 @@
   <p:clrMapOvr>
     <a:masterClrMapping/>
   </p:clrMapOvr>
+  <p:timing>
+    <p:tnLst>
+      <p:par>
+        <p:cTn id="1" dur="indefinite" restart="never" nodeType="tmRoot"/>
+      </p:par>
+    </p:tnLst>
+  </p:timing>
 </p:sld>
 </file>
 
@@ -20248,504 +20541,7 @@
       </p:grpSpPr>
       <p:sp>
         <p:nvSpPr>
-          <p:cNvPr id="9" name="Rectangle 8"/>
-          <p:cNvSpPr/>
-          <p:nvPr/>
-        </p:nvSpPr>
-        <p:spPr>
-          <a:xfrm>
-            <a:off x="0" y="1295400"/>
-            <a:ext cx="9144000" cy="4154984"/>
-          </a:xfrm>
-          <a:prstGeom prst="rect">
-            <a:avLst/>
-          </a:prstGeom>
-        </p:spPr>
-        <p:txBody>
-          <a:bodyPr wrap="square">
-            <a:spAutoFit/>
-          </a:bodyPr>
-          <a:lstStyle/>
-          <a:p>
-            <a:r>
-              <a:rPr lang="en-US" sz="2400" dirty="0">
-                <a:solidFill>
-                  <a:srgbClr val="0000FF"/>
-                </a:solidFill>
-                <a:latin typeface="Consolas"/>
-              </a:rPr>
-              <a:t>using</a:t>
-            </a:r>
-            <a:r>
-              <a:rPr lang="en-US" sz="2400" dirty="0">
-                <a:solidFill>
-                  <a:prstClr val="black"/>
-                </a:solidFill>
-                <a:latin typeface="Consolas"/>
-              </a:rPr>
-              <a:t> </a:t>
-            </a:r>
-            <a:r>
-              <a:rPr lang="en-US" sz="2400" dirty="0" err="1">
-                <a:solidFill>
-                  <a:prstClr val="black"/>
-                </a:solidFill>
-                <a:latin typeface="Consolas"/>
-              </a:rPr>
-              <a:t>System.Collections.Generic</a:t>
-            </a:r>
-            <a:r>
-              <a:rPr lang="en-US" sz="2400" dirty="0">
-                <a:solidFill>
-                  <a:prstClr val="black"/>
-                </a:solidFill>
-                <a:latin typeface="Consolas"/>
-              </a:rPr>
-              <a:t>;</a:t>
-            </a:r>
-          </a:p>
-          <a:p>
-            <a:r>
-              <a:rPr lang="en-US" sz="2400" b="1" dirty="0">
-                <a:solidFill>
-                  <a:srgbClr val="0000FF"/>
-                </a:solidFill>
-                <a:latin typeface="Consolas"/>
-              </a:rPr>
-              <a:t>using</a:t>
-            </a:r>
-            <a:r>
-              <a:rPr lang="en-US" sz="2400" b="1" dirty="0">
-                <a:solidFill>
-                  <a:prstClr val="black"/>
-                </a:solidFill>
-                <a:latin typeface="Consolas"/>
-              </a:rPr>
-              <a:t> </a:t>
-            </a:r>
-            <a:r>
-              <a:rPr lang="en-US" sz="2400" b="1" dirty="0" err="1">
-                <a:solidFill>
-                  <a:prstClr val="black"/>
-                </a:solidFill>
-                <a:latin typeface="Consolas"/>
-              </a:rPr>
-              <a:t>System.Linq</a:t>
-            </a:r>
-            <a:r>
-              <a:rPr lang="en-US" sz="2400" b="1" dirty="0" smtClean="0">
-                <a:solidFill>
-                  <a:prstClr val="black"/>
-                </a:solidFill>
-                <a:latin typeface="Consolas"/>
-              </a:rPr>
-              <a:t>;</a:t>
-            </a:r>
-            <a:endParaRPr lang="en-US" sz="2400" b="1" dirty="0" smtClean="0">
-              <a:solidFill>
-                <a:srgbClr val="0000FF"/>
-              </a:solidFill>
-              <a:latin typeface="Consolas"/>
-            </a:endParaRPr>
-          </a:p>
-          <a:p>
-            <a:endParaRPr lang="en-US" sz="2400" dirty="0">
-              <a:solidFill>
-                <a:srgbClr val="0000FF"/>
-              </a:solidFill>
-              <a:latin typeface="Consolas"/>
-            </a:endParaRPr>
-          </a:p>
-          <a:p>
-            <a:r>
-              <a:rPr lang="en-US" sz="2400" dirty="0" smtClean="0">
-                <a:solidFill>
-                  <a:srgbClr val="0000FF"/>
-                </a:solidFill>
-                <a:latin typeface="Consolas"/>
-              </a:rPr>
-              <a:t>static</a:t>
-            </a:r>
-            <a:r>
-              <a:rPr lang="en-US" sz="2400" dirty="0" smtClean="0">
-                <a:solidFill>
-                  <a:prstClr val="black"/>
-                </a:solidFill>
-                <a:latin typeface="Consolas"/>
-              </a:rPr>
-              <a:t> </a:t>
-            </a:r>
-            <a:r>
-              <a:rPr lang="en-US" sz="2400" dirty="0">
-                <a:solidFill>
-                  <a:srgbClr val="0000FF"/>
-                </a:solidFill>
-                <a:latin typeface="Consolas"/>
-              </a:rPr>
-              <a:t>void</a:t>
-            </a:r>
-            <a:r>
-              <a:rPr lang="en-US" sz="2400" dirty="0">
-                <a:solidFill>
-                  <a:prstClr val="black"/>
-                </a:solidFill>
-                <a:latin typeface="Consolas"/>
-              </a:rPr>
-              <a:t> Main(</a:t>
-            </a:r>
-            <a:r>
-              <a:rPr lang="en-US" sz="2400" dirty="0">
-                <a:solidFill>
-                  <a:srgbClr val="0000FF"/>
-                </a:solidFill>
-                <a:latin typeface="Consolas"/>
-              </a:rPr>
-              <a:t>string</a:t>
-            </a:r>
-            <a:r>
-              <a:rPr lang="en-US" sz="2400" dirty="0">
-                <a:solidFill>
-                  <a:prstClr val="black"/>
-                </a:solidFill>
-                <a:latin typeface="Consolas"/>
-              </a:rPr>
-              <a:t>[] </a:t>
-            </a:r>
-            <a:r>
-              <a:rPr lang="en-US" sz="2400" dirty="0" err="1">
-                <a:solidFill>
-                  <a:prstClr val="black"/>
-                </a:solidFill>
-                <a:latin typeface="Consolas"/>
-              </a:rPr>
-              <a:t>args</a:t>
-            </a:r>
-            <a:r>
-              <a:rPr lang="en-US" sz="2400" dirty="0">
-                <a:solidFill>
-                  <a:prstClr val="black"/>
-                </a:solidFill>
-                <a:latin typeface="Consolas"/>
-              </a:rPr>
-              <a:t>)</a:t>
-            </a:r>
-          </a:p>
-          <a:p>
-            <a:r>
-              <a:rPr lang="en-US" sz="2400" dirty="0" smtClean="0">
-                <a:solidFill>
-                  <a:prstClr val="black"/>
-                </a:solidFill>
-                <a:latin typeface="Consolas"/>
-              </a:rPr>
-              <a:t>{</a:t>
-            </a:r>
-            <a:endParaRPr lang="en-US" sz="2400" dirty="0">
-              <a:solidFill>
-                <a:prstClr val="black"/>
-              </a:solidFill>
-              <a:latin typeface="Consolas"/>
-            </a:endParaRPr>
-          </a:p>
-          <a:p>
-            <a:r>
-              <a:rPr lang="en-US" sz="2400" dirty="0" smtClean="0">
-                <a:solidFill>
-                  <a:srgbClr val="0000FF"/>
-                </a:solidFill>
-                <a:latin typeface="Consolas"/>
-              </a:rPr>
-              <a:t>    </a:t>
-            </a:r>
-            <a:r>
-              <a:rPr lang="en-US" sz="2400" dirty="0" err="1" smtClean="0">
-                <a:solidFill>
-                  <a:srgbClr val="0000FF"/>
-                </a:solidFill>
-                <a:latin typeface="Consolas"/>
-              </a:rPr>
-              <a:t>int</a:t>
-            </a:r>
-            <a:r>
-              <a:rPr lang="en-US" sz="2400" dirty="0">
-                <a:solidFill>
-                  <a:prstClr val="black"/>
-                </a:solidFill>
-                <a:latin typeface="Consolas"/>
-              </a:rPr>
-              <a:t>[] </a:t>
-            </a:r>
-            <a:r>
-              <a:rPr lang="en-US" sz="2400" dirty="0" err="1">
-                <a:solidFill>
-                  <a:prstClr val="black"/>
-                </a:solidFill>
-                <a:latin typeface="Consolas"/>
-              </a:rPr>
-              <a:t>arr</a:t>
-            </a:r>
-            <a:r>
-              <a:rPr lang="en-US" sz="2400" dirty="0">
-                <a:solidFill>
-                  <a:prstClr val="black"/>
-                </a:solidFill>
-                <a:latin typeface="Consolas"/>
-              </a:rPr>
-              <a:t> = </a:t>
-            </a:r>
-            <a:r>
-              <a:rPr lang="en-US" sz="2400" dirty="0">
-                <a:solidFill>
-                  <a:srgbClr val="0000FF"/>
-                </a:solidFill>
-                <a:latin typeface="Consolas"/>
-              </a:rPr>
-              <a:t>new</a:t>
-            </a:r>
-            <a:r>
-              <a:rPr lang="en-US" sz="2400" dirty="0">
-                <a:solidFill>
-                  <a:prstClr val="black"/>
-                </a:solidFill>
-                <a:latin typeface="Consolas"/>
-              </a:rPr>
-              <a:t> </a:t>
-            </a:r>
-            <a:r>
-              <a:rPr lang="en-US" sz="2400" dirty="0" err="1">
-                <a:solidFill>
-                  <a:srgbClr val="0000FF"/>
-                </a:solidFill>
-                <a:latin typeface="Consolas"/>
-              </a:rPr>
-              <a:t>int</a:t>
-            </a:r>
-            <a:r>
-              <a:rPr lang="en-US" sz="2400" dirty="0">
-                <a:solidFill>
-                  <a:prstClr val="black"/>
-                </a:solidFill>
-                <a:latin typeface="Consolas"/>
-              </a:rPr>
-              <a:t>[] { 1, -1, 0, 4, -3, 2 };</a:t>
-            </a:r>
-          </a:p>
-          <a:p>
-            <a:r>
-              <a:rPr lang="en-US" sz="2400" dirty="0">
-                <a:solidFill>
-                  <a:prstClr val="black"/>
-                </a:solidFill>
-                <a:latin typeface="Consolas"/>
-              </a:rPr>
-              <a:t>    </a:t>
-            </a:r>
-            <a:r>
-              <a:rPr lang="en-US" sz="2400" dirty="0" err="1" smtClean="0">
-                <a:solidFill>
-                  <a:srgbClr val="2B91AF"/>
-                </a:solidFill>
-                <a:latin typeface="Consolas"/>
-              </a:rPr>
-              <a:t>IEnumerable</a:t>
-            </a:r>
-            <a:r>
-              <a:rPr lang="en-US" sz="2400" dirty="0" smtClean="0">
-                <a:solidFill>
-                  <a:prstClr val="black"/>
-                </a:solidFill>
-                <a:latin typeface="Consolas"/>
-              </a:rPr>
-              <a:t>&lt;</a:t>
-            </a:r>
-            <a:r>
-              <a:rPr lang="en-US" sz="2400" dirty="0" err="1" smtClean="0">
-                <a:solidFill>
-                  <a:srgbClr val="0000FF"/>
-                </a:solidFill>
-                <a:latin typeface="Consolas"/>
-              </a:rPr>
-              <a:t>int</a:t>
-            </a:r>
-            <a:r>
-              <a:rPr lang="en-US" sz="2400" dirty="0">
-                <a:solidFill>
-                  <a:prstClr val="black"/>
-                </a:solidFill>
-                <a:latin typeface="Consolas"/>
-              </a:rPr>
-              <a:t>&gt; query = </a:t>
-            </a:r>
-          </a:p>
-          <a:p>
-            <a:r>
-              <a:rPr lang="en-US" sz="2400" dirty="0">
-                <a:solidFill>
-                  <a:prstClr val="black"/>
-                </a:solidFill>
-                <a:latin typeface="Consolas"/>
-              </a:rPr>
-              <a:t>    </a:t>
-            </a:r>
-            <a:r>
-              <a:rPr lang="en-US" sz="2400" dirty="0" smtClean="0">
-                <a:solidFill>
-                  <a:prstClr val="black"/>
-                </a:solidFill>
-                <a:latin typeface="Consolas"/>
-              </a:rPr>
-              <a:t>    </a:t>
-            </a:r>
-            <a:r>
-              <a:rPr lang="en-US" sz="2400" b="1" dirty="0" err="1" smtClean="0">
-                <a:solidFill>
-                  <a:prstClr val="black"/>
-                </a:solidFill>
-                <a:latin typeface="Consolas"/>
-              </a:rPr>
-              <a:t>arr.Where</a:t>
-            </a:r>
-            <a:r>
-              <a:rPr lang="en-US" sz="2400" dirty="0" smtClean="0">
-                <a:solidFill>
-                  <a:prstClr val="black"/>
-                </a:solidFill>
-                <a:latin typeface="Consolas"/>
-              </a:rPr>
-              <a:t>(v </a:t>
-            </a:r>
-            <a:r>
-              <a:rPr lang="en-US" sz="2400" dirty="0">
-                <a:solidFill>
-                  <a:prstClr val="black"/>
-                </a:solidFill>
-                <a:latin typeface="Consolas"/>
-              </a:rPr>
-              <a:t>=&gt; v &gt; 0);</a:t>
-            </a:r>
-          </a:p>
-          <a:p>
-            <a:r>
-              <a:rPr lang="en-US" sz="2400" dirty="0">
-                <a:solidFill>
-                  <a:prstClr val="black"/>
-                </a:solidFill>
-                <a:latin typeface="Consolas"/>
-              </a:rPr>
-              <a:t>    </a:t>
-            </a:r>
-            <a:r>
-              <a:rPr lang="en-US" sz="2400" dirty="0" err="1" smtClean="0">
-                <a:solidFill>
-                  <a:srgbClr val="0000FF"/>
-                </a:solidFill>
-                <a:latin typeface="Consolas"/>
-              </a:rPr>
-              <a:t>int</a:t>
-            </a:r>
-            <a:r>
-              <a:rPr lang="en-US" sz="2400" dirty="0">
-                <a:solidFill>
-                  <a:prstClr val="black"/>
-                </a:solidFill>
-                <a:latin typeface="Consolas"/>
-              </a:rPr>
-              <a:t>[] </a:t>
-            </a:r>
-            <a:r>
-              <a:rPr lang="en-US" sz="2400" dirty="0" err="1">
-                <a:solidFill>
-                  <a:prstClr val="black"/>
-                </a:solidFill>
-                <a:latin typeface="Consolas"/>
-              </a:rPr>
-              <a:t>positiveArr</a:t>
-            </a:r>
-            <a:r>
-              <a:rPr lang="en-US" sz="2400" dirty="0">
-                <a:solidFill>
-                  <a:prstClr val="black"/>
-                </a:solidFill>
-                <a:latin typeface="Consolas"/>
-              </a:rPr>
-              <a:t> = </a:t>
-            </a:r>
-            <a:r>
-              <a:rPr lang="en-US" sz="2400" b="1" dirty="0" err="1">
-                <a:solidFill>
-                  <a:prstClr val="black"/>
-                </a:solidFill>
-                <a:latin typeface="Consolas"/>
-              </a:rPr>
-              <a:t>arr.ToArray</a:t>
-            </a:r>
-            <a:r>
-              <a:rPr lang="en-US" sz="2400" dirty="0" smtClean="0">
-                <a:solidFill>
-                  <a:prstClr val="black"/>
-                </a:solidFill>
-                <a:latin typeface="Consolas"/>
-              </a:rPr>
-              <a:t>();</a:t>
-            </a:r>
-          </a:p>
-          <a:p>
-            <a:r>
-              <a:rPr lang="en-US" sz="2400" dirty="0" smtClean="0">
-                <a:solidFill>
-                  <a:prstClr val="black"/>
-                </a:solidFill>
-                <a:latin typeface="Consolas"/>
-              </a:rPr>
-              <a:t>    </a:t>
-            </a:r>
-            <a:r>
-              <a:rPr lang="en-US" sz="2400" dirty="0">
-                <a:solidFill>
-                  <a:srgbClr val="008000"/>
-                </a:solidFill>
-                <a:latin typeface="Consolas"/>
-              </a:rPr>
-              <a:t>// contains { 1, 4, 2 </a:t>
-            </a:r>
-            <a:r>
-              <a:rPr lang="en-US" sz="2400" dirty="0" smtClean="0">
-                <a:solidFill>
-                  <a:srgbClr val="008000"/>
-                </a:solidFill>
-                <a:latin typeface="Consolas"/>
-              </a:rPr>
-              <a:t>}</a:t>
-            </a:r>
-            <a:endParaRPr lang="en-US" sz="2400" dirty="0" smtClean="0">
-              <a:solidFill>
-                <a:prstClr val="black"/>
-              </a:solidFill>
-              <a:latin typeface="Consolas"/>
-            </a:endParaRPr>
-          </a:p>
-          <a:p>
-            <a:r>
-              <a:rPr lang="en-US" sz="2400" dirty="0" smtClean="0">
-                <a:solidFill>
-                  <a:prstClr val="black"/>
-                </a:solidFill>
-                <a:latin typeface="Consolas"/>
-              </a:rPr>
-              <a:t>}</a:t>
-            </a:r>
-            <a:endParaRPr lang="en-US" sz="2400" dirty="0">
-              <a:solidFill>
-                <a:prstClr val="black"/>
-              </a:solidFill>
-              <a:latin typeface="Consolas"/>
-            </a:endParaRPr>
-          </a:p>
-        </p:txBody>
-      </p:sp>
-      <p:sp>
-        <p:nvSpPr>
-          <p:cNvPr id="5" name="Title 1"/>
+          <p:cNvPr id="2" name="Title 1"/>
           <p:cNvSpPr>
             <a:spLocks noGrp="1"/>
           </p:cNvSpPr>
@@ -20753,19 +20549,14 @@
             <p:ph type="title"/>
           </p:nvPr>
         </p:nvSpPr>
-        <p:spPr>
-          <a:xfrm>
-            <a:off x="457200" y="0"/>
-            <a:ext cx="8229600" cy="1143000"/>
-          </a:xfrm>
-        </p:spPr>
+        <p:spPr/>
         <p:txBody>
           <a:bodyPr/>
           <a:lstStyle/>
           <a:p>
             <a:r>
               <a:rPr lang="en-US" dirty="0" smtClean="0"/>
-              <a:t>LINQ: Where</a:t>
+              <a:t>LINQ: Select</a:t>
             </a:r>
             <a:endParaRPr lang="en-US" dirty="0"/>
           </a:p>
@@ -20773,47 +20564,7 @@
       </p:sp>
       <p:sp>
         <p:nvSpPr>
-          <p:cNvPr id="7" name="Up Arrow 6"/>
-          <p:cNvSpPr/>
-          <p:nvPr/>
-        </p:nvSpPr>
-        <p:spPr>
-          <a:xfrm>
-            <a:off x="4343400" y="4572000"/>
-            <a:ext cx="1524000" cy="990600"/>
-          </a:xfrm>
-          <a:prstGeom prst="upArrow">
-            <a:avLst/>
-          </a:prstGeom>
-        </p:spPr>
-        <p:style>
-          <a:lnRef idx="2">
-            <a:schemeClr val="accent1">
-              <a:shade val="50000"/>
-            </a:schemeClr>
-          </a:lnRef>
-          <a:fillRef idx="1">
-            <a:schemeClr val="accent1"/>
-          </a:fillRef>
-          <a:effectRef idx="0">
-            <a:schemeClr val="accent1"/>
-          </a:effectRef>
-          <a:fontRef idx="minor">
-            <a:schemeClr val="lt1"/>
-          </a:fontRef>
-        </p:style>
-        <p:txBody>
-          <a:bodyPr rtlCol="0" anchor="ctr"/>
-          <a:lstStyle/>
-          <a:p>
-            <a:pPr algn="ctr"/>
-            <a:endParaRPr lang="en-US"/>
-          </a:p>
-        </p:txBody>
-      </p:sp>
-      <p:sp>
-        <p:nvSpPr>
-          <p:cNvPr id="8" name="Content Placeholder 2"/>
+          <p:cNvPr id="3" name="Content Placeholder 2"/>
           <p:cNvSpPr>
             <a:spLocks noGrp="1"/>
           </p:cNvSpPr>
@@ -20821,112 +20572,235 @@
             <p:ph idx="1"/>
           </p:nvPr>
         </p:nvSpPr>
-        <p:spPr>
-          <a:xfrm>
-            <a:off x="0" y="5715000"/>
-            <a:ext cx="9144000" cy="990600"/>
-          </a:xfrm>
-        </p:spPr>
+        <p:spPr/>
         <p:txBody>
-          <a:bodyPr>
-            <a:normAutofit lnSpcReduction="10000"/>
-          </a:bodyPr>
+          <a:bodyPr/>
           <a:lstStyle/>
           <a:p>
             <a:r>
-              <a:rPr lang="en-US" b="1" dirty="0" err="1" smtClean="0"/>
-              <a:t>ToArray</a:t>
-            </a:r>
-            <a:r>
               <a:rPr lang="en-US" dirty="0" smtClean="0"/>
-              <a:t>, like </a:t>
+              <a:t>Suppose you have an array of product objects, each of which have a name and price.</a:t>
+            </a:r>
+          </a:p>
+          <a:p>
+            <a:endParaRPr lang="en-US" dirty="0"/>
+          </a:p>
+          <a:p>
+            <a:endParaRPr lang="en-US" dirty="0" smtClean="0"/>
+          </a:p>
+          <a:p>
+            <a:endParaRPr lang="en-US" dirty="0"/>
+          </a:p>
+          <a:p>
+            <a:r>
+              <a:rPr lang="en-US" dirty="0" smtClean="0"/>
+              <a:t>You want an array of strings, with all the product names. We can use </a:t>
             </a:r>
             <a:r>
               <a:rPr lang="en-US" b="1" dirty="0" smtClean="0"/>
-              <a:t>Where</a:t>
+              <a:t>Select</a:t>
             </a:r>
             <a:r>
               <a:rPr lang="en-US" dirty="0" smtClean="0"/>
-              <a:t>, is also an extension method for </a:t>
-            </a:r>
-            <a:r>
-              <a:rPr lang="en-US" dirty="0" err="1" smtClean="0"/>
-              <a:t>IEnumerable</a:t>
-            </a:r>
-            <a:r>
-              <a:rPr lang="en-US" dirty="0" smtClean="0"/>
-              <a:t>. Both are defined in </a:t>
-            </a:r>
-            <a:r>
-              <a:rPr lang="en-US" b="1" dirty="0" err="1" smtClean="0"/>
-              <a:t>System.Linq</a:t>
-            </a:r>
-            <a:endParaRPr lang="en-US" b="1" dirty="0" smtClean="0"/>
+              <a:t> for this</a:t>
+            </a:r>
+            <a:endParaRPr lang="en-US" dirty="0"/>
           </a:p>
         </p:txBody>
       </p:sp>
       <p:sp>
         <p:nvSpPr>
-          <p:cNvPr id="3" name="Left Arrow 2"/>
+          <p:cNvPr id="5" name="Rectangle 4"/>
           <p:cNvSpPr/>
           <p:nvPr/>
         </p:nvSpPr>
         <p:spPr>
           <a:xfrm>
-            <a:off x="3200400" y="1600200"/>
-            <a:ext cx="5943600" cy="609600"/>
+            <a:off x="2286000" y="2690336"/>
+            <a:ext cx="4572000" cy="1785104"/>
           </a:xfrm>
-          <a:prstGeom prst="leftArrow">
+          <a:prstGeom prst="rect">
             <a:avLst/>
           </a:prstGeom>
         </p:spPr>
-        <p:style>
-          <a:lnRef idx="2">
-            <a:schemeClr val="accent1">
-              <a:shade val="50000"/>
-            </a:schemeClr>
-          </a:lnRef>
-          <a:fillRef idx="1">
-            <a:schemeClr val="accent1"/>
-          </a:fillRef>
-          <a:effectRef idx="0">
-            <a:schemeClr val="accent1"/>
-          </a:effectRef>
-          <a:fontRef idx="minor">
-            <a:schemeClr val="lt1"/>
-          </a:fontRef>
-        </p:style>
         <p:txBody>
-          <a:bodyPr rtlCol="0" anchor="ctr"/>
+          <a:bodyPr>
+            <a:spAutoFit/>
+          </a:bodyPr>
           <a:lstStyle/>
           <a:p>
-            <a:pPr algn="ctr"/>
-            <a:r>
-              <a:rPr lang="en-US" dirty="0" smtClean="0"/>
-              <a:t>Need this, otherwise Where and </a:t>
-            </a:r>
-            <a:r>
-              <a:rPr lang="en-US" dirty="0" err="1" smtClean="0"/>
-              <a:t>ToArray</a:t>
-            </a:r>
-            <a:r>
-              <a:rPr lang="en-US" dirty="0" smtClean="0"/>
-              <a:t> won’t be defined</a:t>
-            </a:r>
-            <a:endParaRPr lang="en-US" dirty="0"/>
+            <a:r>
+              <a:rPr lang="en-US" sz="2200" dirty="0">
+                <a:solidFill>
+                  <a:srgbClr val="0000FF"/>
+                </a:solidFill>
+                <a:latin typeface="Consolas"/>
+              </a:rPr>
+              <a:t>class</a:t>
+            </a:r>
+            <a:r>
+              <a:rPr lang="en-US" sz="2200" dirty="0">
+                <a:solidFill>
+                  <a:prstClr val="black"/>
+                </a:solidFill>
+                <a:latin typeface="Consolas"/>
+              </a:rPr>
+              <a:t> </a:t>
+            </a:r>
+            <a:r>
+              <a:rPr lang="en-US" sz="2200" dirty="0">
+                <a:solidFill>
+                  <a:srgbClr val="2B91AF"/>
+                </a:solidFill>
+                <a:latin typeface="Consolas"/>
+              </a:rPr>
+              <a:t>Product</a:t>
+            </a:r>
+            <a:endParaRPr lang="en-US" sz="2200" dirty="0">
+              <a:solidFill>
+                <a:prstClr val="black"/>
+              </a:solidFill>
+              <a:latin typeface="Consolas"/>
+            </a:endParaRPr>
+          </a:p>
+          <a:p>
+            <a:r>
+              <a:rPr lang="en-US" sz="2200" dirty="0" smtClean="0">
+                <a:solidFill>
+                  <a:prstClr val="black"/>
+                </a:solidFill>
+                <a:latin typeface="Consolas"/>
+              </a:rPr>
+              <a:t>{</a:t>
+            </a:r>
+            <a:endParaRPr lang="en-US" sz="2200" dirty="0">
+              <a:solidFill>
+                <a:prstClr val="black"/>
+              </a:solidFill>
+              <a:latin typeface="Consolas"/>
+            </a:endParaRPr>
+          </a:p>
+          <a:p>
+            <a:r>
+              <a:rPr lang="en-US" sz="2200" dirty="0">
+                <a:solidFill>
+                  <a:prstClr val="black"/>
+                </a:solidFill>
+                <a:latin typeface="Consolas"/>
+              </a:rPr>
+              <a:t>    </a:t>
+            </a:r>
+            <a:r>
+              <a:rPr lang="en-US" sz="2200" dirty="0" smtClean="0">
+                <a:solidFill>
+                  <a:srgbClr val="0000FF"/>
+                </a:solidFill>
+                <a:latin typeface="Consolas"/>
+              </a:rPr>
+              <a:t>public</a:t>
+            </a:r>
+            <a:r>
+              <a:rPr lang="en-US" sz="2200" dirty="0" smtClean="0">
+                <a:solidFill>
+                  <a:prstClr val="black"/>
+                </a:solidFill>
+                <a:latin typeface="Consolas"/>
+              </a:rPr>
+              <a:t> </a:t>
+            </a:r>
+            <a:r>
+              <a:rPr lang="en-US" sz="2200" dirty="0">
+                <a:solidFill>
+                  <a:srgbClr val="0000FF"/>
+                </a:solidFill>
+                <a:latin typeface="Consolas"/>
+              </a:rPr>
+              <a:t>string</a:t>
+            </a:r>
+            <a:r>
+              <a:rPr lang="en-US" sz="2200" dirty="0">
+                <a:solidFill>
+                  <a:prstClr val="black"/>
+                </a:solidFill>
+                <a:latin typeface="Consolas"/>
+              </a:rPr>
+              <a:t> name;</a:t>
+            </a:r>
+          </a:p>
+          <a:p>
+            <a:r>
+              <a:rPr lang="en-US" sz="2200" dirty="0" smtClean="0">
+                <a:solidFill>
+                  <a:srgbClr val="0000FF"/>
+                </a:solidFill>
+                <a:latin typeface="Consolas"/>
+              </a:rPr>
+              <a:t>    public</a:t>
+            </a:r>
+            <a:r>
+              <a:rPr lang="en-US" sz="2200" dirty="0" smtClean="0">
+                <a:solidFill>
+                  <a:prstClr val="black"/>
+                </a:solidFill>
+                <a:latin typeface="Consolas"/>
+              </a:rPr>
+              <a:t> </a:t>
+            </a:r>
+            <a:r>
+              <a:rPr lang="en-US" sz="2200" dirty="0" err="1">
+                <a:solidFill>
+                  <a:srgbClr val="0000FF"/>
+                </a:solidFill>
+                <a:latin typeface="Consolas"/>
+              </a:rPr>
+              <a:t>int</a:t>
+            </a:r>
+            <a:r>
+              <a:rPr lang="en-US" sz="2200" dirty="0">
+                <a:solidFill>
+                  <a:prstClr val="black"/>
+                </a:solidFill>
+                <a:latin typeface="Consolas"/>
+              </a:rPr>
+              <a:t> price;</a:t>
+            </a:r>
+          </a:p>
+          <a:p>
+            <a:r>
+              <a:rPr lang="en-US" sz="2200" dirty="0" smtClean="0">
+                <a:solidFill>
+                  <a:prstClr val="black"/>
+                </a:solidFill>
+                <a:latin typeface="Consolas"/>
+              </a:rPr>
+              <a:t>}</a:t>
+            </a:r>
+            <a:endParaRPr lang="en-US" sz="2200" dirty="0">
+              <a:solidFill>
+                <a:prstClr val="black"/>
+              </a:solidFill>
+              <a:latin typeface="Consolas"/>
+            </a:endParaRPr>
           </a:p>
         </p:txBody>
       </p:sp>
     </p:spTree>
     <p:extLst>
       <p:ext uri="{BB962C8B-B14F-4D97-AF65-F5344CB8AC3E}">
-        <p14:creationId xmlns:p14="http://schemas.microsoft.com/office/powerpoint/2010/main" val="899602899"/>
+        <p14:creationId xmlns:p14="http://schemas.microsoft.com/office/powerpoint/2010/main" val="3488935663"/>
       </p:ext>
     </p:extLst>
   </p:cSld>
   <p:clrMapOvr>
     <a:masterClrMapping/>
   </p:clrMapOvr>
+  <p:timing>
+    <p:tnLst>
+      <p:par>
+        <p:cTn id="1" dur="indefinite" restart="never" nodeType="tmRoot"/>
+      </p:par>
+    </p:tnLst>
+  </p:timing>
 </p:sld>
 </file>
 
@@ -20972,281 +20846,6 @@
       </p:sp>
       <p:sp>
         <p:nvSpPr>
-          <p:cNvPr id="3" name="Content Placeholder 2"/>
-          <p:cNvSpPr>
-            <a:spLocks noGrp="1"/>
-          </p:cNvSpPr>
-          <p:nvPr>
-            <p:ph idx="1"/>
-          </p:nvPr>
-        </p:nvSpPr>
-        <p:spPr/>
-        <p:txBody>
-          <a:bodyPr/>
-          <a:lstStyle/>
-          <a:p>
-            <a:r>
-              <a:rPr lang="en-US" dirty="0" smtClean="0"/>
-              <a:t>Suppose you have an array of product objects, each of which have a name and price.</a:t>
-            </a:r>
-          </a:p>
-          <a:p>
-            <a:endParaRPr lang="en-US" dirty="0"/>
-          </a:p>
-          <a:p>
-            <a:endParaRPr lang="en-US" dirty="0" smtClean="0"/>
-          </a:p>
-          <a:p>
-            <a:endParaRPr lang="en-US" dirty="0"/>
-          </a:p>
-          <a:p>
-            <a:r>
-              <a:rPr lang="en-US" dirty="0" smtClean="0"/>
-              <a:t>You want an array of strings, with all the product names. We can use </a:t>
-            </a:r>
-            <a:r>
-              <a:rPr lang="en-US" b="1" dirty="0" smtClean="0"/>
-              <a:t>Select</a:t>
-            </a:r>
-            <a:r>
-              <a:rPr lang="en-US" dirty="0" smtClean="0"/>
-              <a:t> for this</a:t>
-            </a:r>
-            <a:endParaRPr lang="en-US" dirty="0"/>
-          </a:p>
-        </p:txBody>
-      </p:sp>
-      <p:sp>
-        <p:nvSpPr>
-          <p:cNvPr id="5" name="Rectangle 4"/>
-          <p:cNvSpPr/>
-          <p:nvPr/>
-        </p:nvSpPr>
-        <p:spPr>
-          <a:xfrm>
-            <a:off x="2286000" y="2690336"/>
-            <a:ext cx="4572000" cy="1785104"/>
-          </a:xfrm>
-          <a:prstGeom prst="rect">
-            <a:avLst/>
-          </a:prstGeom>
-        </p:spPr>
-        <p:txBody>
-          <a:bodyPr>
-            <a:spAutoFit/>
-          </a:bodyPr>
-          <a:lstStyle/>
-          <a:p>
-            <a:r>
-              <a:rPr lang="en-US" sz="2200" dirty="0">
-                <a:solidFill>
-                  <a:srgbClr val="0000FF"/>
-                </a:solidFill>
-                <a:latin typeface="Consolas"/>
-              </a:rPr>
-              <a:t>class</a:t>
-            </a:r>
-            <a:r>
-              <a:rPr lang="en-US" sz="2200" dirty="0">
-                <a:solidFill>
-                  <a:prstClr val="black"/>
-                </a:solidFill>
-                <a:latin typeface="Consolas"/>
-              </a:rPr>
-              <a:t> </a:t>
-            </a:r>
-            <a:r>
-              <a:rPr lang="en-US" sz="2200" dirty="0">
-                <a:solidFill>
-                  <a:srgbClr val="2B91AF"/>
-                </a:solidFill>
-                <a:latin typeface="Consolas"/>
-              </a:rPr>
-              <a:t>Product</a:t>
-            </a:r>
-            <a:endParaRPr lang="en-US" sz="2200" dirty="0">
-              <a:solidFill>
-                <a:prstClr val="black"/>
-              </a:solidFill>
-              <a:latin typeface="Consolas"/>
-            </a:endParaRPr>
-          </a:p>
-          <a:p>
-            <a:r>
-              <a:rPr lang="en-US" sz="2200" dirty="0" smtClean="0">
-                <a:solidFill>
-                  <a:prstClr val="black"/>
-                </a:solidFill>
-                <a:latin typeface="Consolas"/>
-              </a:rPr>
-              <a:t>{</a:t>
-            </a:r>
-            <a:endParaRPr lang="en-US" sz="2200" dirty="0">
-              <a:solidFill>
-                <a:prstClr val="black"/>
-              </a:solidFill>
-              <a:latin typeface="Consolas"/>
-            </a:endParaRPr>
-          </a:p>
-          <a:p>
-            <a:r>
-              <a:rPr lang="en-US" sz="2200" dirty="0">
-                <a:solidFill>
-                  <a:prstClr val="black"/>
-                </a:solidFill>
-                <a:latin typeface="Consolas"/>
-              </a:rPr>
-              <a:t>    </a:t>
-            </a:r>
-            <a:r>
-              <a:rPr lang="en-US" sz="2200" dirty="0" smtClean="0">
-                <a:solidFill>
-                  <a:srgbClr val="0000FF"/>
-                </a:solidFill>
-                <a:latin typeface="Consolas"/>
-              </a:rPr>
-              <a:t>public</a:t>
-            </a:r>
-            <a:r>
-              <a:rPr lang="en-US" sz="2200" dirty="0" smtClean="0">
-                <a:solidFill>
-                  <a:prstClr val="black"/>
-                </a:solidFill>
-                <a:latin typeface="Consolas"/>
-              </a:rPr>
-              <a:t> </a:t>
-            </a:r>
-            <a:r>
-              <a:rPr lang="en-US" sz="2200" dirty="0">
-                <a:solidFill>
-                  <a:srgbClr val="0000FF"/>
-                </a:solidFill>
-                <a:latin typeface="Consolas"/>
-              </a:rPr>
-              <a:t>string</a:t>
-            </a:r>
-            <a:r>
-              <a:rPr lang="en-US" sz="2200" dirty="0">
-                <a:solidFill>
-                  <a:prstClr val="black"/>
-                </a:solidFill>
-                <a:latin typeface="Consolas"/>
-              </a:rPr>
-              <a:t> name;</a:t>
-            </a:r>
-          </a:p>
-          <a:p>
-            <a:r>
-              <a:rPr lang="en-US" sz="2200" dirty="0" smtClean="0">
-                <a:solidFill>
-                  <a:srgbClr val="0000FF"/>
-                </a:solidFill>
-                <a:latin typeface="Consolas"/>
-              </a:rPr>
-              <a:t>    public</a:t>
-            </a:r>
-            <a:r>
-              <a:rPr lang="en-US" sz="2200" dirty="0" smtClean="0">
-                <a:solidFill>
-                  <a:prstClr val="black"/>
-                </a:solidFill>
-                <a:latin typeface="Consolas"/>
-              </a:rPr>
-              <a:t> </a:t>
-            </a:r>
-            <a:r>
-              <a:rPr lang="en-US" sz="2200" dirty="0" err="1">
-                <a:solidFill>
-                  <a:srgbClr val="0000FF"/>
-                </a:solidFill>
-                <a:latin typeface="Consolas"/>
-              </a:rPr>
-              <a:t>int</a:t>
-            </a:r>
-            <a:r>
-              <a:rPr lang="en-US" sz="2200" dirty="0">
-                <a:solidFill>
-                  <a:prstClr val="black"/>
-                </a:solidFill>
-                <a:latin typeface="Consolas"/>
-              </a:rPr>
-              <a:t> price;</a:t>
-            </a:r>
-          </a:p>
-          <a:p>
-            <a:r>
-              <a:rPr lang="en-US" sz="2200" dirty="0" smtClean="0">
-                <a:solidFill>
-                  <a:prstClr val="black"/>
-                </a:solidFill>
-                <a:latin typeface="Consolas"/>
-              </a:rPr>
-              <a:t>}</a:t>
-            </a:r>
-            <a:endParaRPr lang="en-US" sz="2200" dirty="0">
-              <a:solidFill>
-                <a:prstClr val="black"/>
-              </a:solidFill>
-              <a:latin typeface="Consolas"/>
-            </a:endParaRPr>
-          </a:p>
-        </p:txBody>
-      </p:sp>
-    </p:spTree>
-    <p:extLst>
-      <p:ext uri="{BB962C8B-B14F-4D97-AF65-F5344CB8AC3E}">
-        <p14:creationId xmlns:p14="http://schemas.microsoft.com/office/powerpoint/2010/main" val="3488935663"/>
-      </p:ext>
-    </p:extLst>
-  </p:cSld>
-  <p:clrMapOvr>
-    <a:masterClrMapping/>
-  </p:clrMapOvr>
-</p:sld>
-</file>
-
-<file path=ppt/slides/slide42.xml><?xml version="1.0" encoding="utf-8"?>
-<p:sld xmlns:a="http://schemas.openxmlformats.org/drawingml/2006/main" xmlns:r="http://schemas.openxmlformats.org/officeDocument/2006/relationships" xmlns:p="http://schemas.openxmlformats.org/presentationml/2006/main">
-  <p:cSld>
-    <p:spTree>
-      <p:nvGrpSpPr>
-        <p:cNvPr id="1" name=""/>
-        <p:cNvGrpSpPr/>
-        <p:nvPr/>
-      </p:nvGrpSpPr>
-      <p:grpSpPr>
-        <a:xfrm>
-          <a:off x="0" y="0"/>
-          <a:ext cx="0" cy="0"/>
-          <a:chOff x="0" y="0"/>
-          <a:chExt cx="0" cy="0"/>
-        </a:xfrm>
-      </p:grpSpPr>
-      <p:sp>
-        <p:nvSpPr>
-          <p:cNvPr id="2" name="Title 1"/>
-          <p:cNvSpPr>
-            <a:spLocks noGrp="1"/>
-          </p:cNvSpPr>
-          <p:nvPr>
-            <p:ph type="title"/>
-          </p:nvPr>
-        </p:nvSpPr>
-        <p:spPr/>
-        <p:txBody>
-          <a:bodyPr/>
-          <a:lstStyle/>
-          <a:p>
-            <a:r>
-              <a:rPr lang="en-US" dirty="0" smtClean="0"/>
-              <a:t>LINQ: Select</a:t>
-            </a:r>
-            <a:endParaRPr lang="en-US" dirty="0"/>
-          </a:p>
-        </p:txBody>
-      </p:sp>
-      <p:sp>
-        <p:nvSpPr>
           <p:cNvPr id="5" name="Rectangle 4"/>
           <p:cNvSpPr/>
           <p:nvPr/>
@@ -21480,10 +21079,17 @@
   <p:clrMapOvr>
     <a:masterClrMapping/>
   </p:clrMapOvr>
+  <p:timing>
+    <p:tnLst>
+      <p:par>
+        <p:cTn id="1" dur="indefinite" restart="never" nodeType="tmRoot"/>
+      </p:par>
+    </p:tnLst>
+  </p:timing>
 </p:sld>
 </file>
 
-<file path=ppt/slides/slide43.xml><?xml version="1.0" encoding="utf-8"?>
+<file path=ppt/slides/slide42.xml><?xml version="1.0" encoding="utf-8"?>
 <p:sld xmlns:a="http://schemas.openxmlformats.org/drawingml/2006/main" xmlns:r="http://schemas.openxmlformats.org/officeDocument/2006/relationships" xmlns:p="http://schemas.openxmlformats.org/presentationml/2006/main">
   <p:cSld>
     <p:spTree>
@@ -21846,10 +21452,17 @@
   <p:clrMapOvr>
     <a:masterClrMapping/>
   </p:clrMapOvr>
+  <p:timing>
+    <p:tnLst>
+      <p:par>
+        <p:cTn id="1" dur="indefinite" restart="never" nodeType="tmRoot"/>
+      </p:par>
+    </p:tnLst>
+  </p:timing>
 </p:sld>
 </file>
 
-<file path=ppt/slides/slide44.xml><?xml version="1.0" encoding="utf-8"?>
+<file path=ppt/slides/slide43.xml><?xml version="1.0" encoding="utf-8"?>
 <p:sld xmlns:a="http://schemas.openxmlformats.org/drawingml/2006/main" xmlns:r="http://schemas.openxmlformats.org/officeDocument/2006/relationships" xmlns:p="http://schemas.openxmlformats.org/presentationml/2006/main">
   <p:cSld>
     <p:spTree>
@@ -22450,6 +22063,365 @@
   <p:clrMapOvr>
     <a:masterClrMapping/>
   </p:clrMapOvr>
+  <p:timing>
+    <p:tnLst>
+      <p:par>
+        <p:cTn id="1" dur="indefinite" restart="never" nodeType="tmRoot"/>
+      </p:par>
+    </p:tnLst>
+  </p:timing>
+</p:sld>
+</file>
+
+<file path=ppt/slides/slide44.xml><?xml version="1.0" encoding="utf-8"?>
+<p:sld xmlns:a="http://schemas.openxmlformats.org/drawingml/2006/main" xmlns:r="http://schemas.openxmlformats.org/officeDocument/2006/relationships" xmlns:p="http://schemas.openxmlformats.org/presentationml/2006/main">
+  <p:cSld>
+    <p:spTree>
+      <p:nvGrpSpPr>
+        <p:cNvPr id="1" name=""/>
+        <p:cNvGrpSpPr/>
+        <p:nvPr/>
+      </p:nvGrpSpPr>
+      <p:grpSpPr>
+        <a:xfrm>
+          <a:off x="0" y="0"/>
+          <a:ext cx="0" cy="0"/>
+          <a:chOff x="0" y="0"/>
+          <a:chExt cx="0" cy="0"/>
+        </a:xfrm>
+      </p:grpSpPr>
+      <p:sp>
+        <p:nvSpPr>
+          <p:cNvPr id="2" name="Title 1"/>
+          <p:cNvSpPr>
+            <a:spLocks noGrp="1"/>
+          </p:cNvSpPr>
+          <p:nvPr>
+            <p:ph type="title"/>
+          </p:nvPr>
+        </p:nvSpPr>
+        <p:spPr/>
+        <p:txBody>
+          <a:bodyPr/>
+          <a:lstStyle/>
+          <a:p>
+            <a:r>
+              <a:rPr lang="en-US" dirty="0" smtClean="0"/>
+              <a:t>Using Where and Select Together</a:t>
+            </a:r>
+            <a:endParaRPr lang="en-US" dirty="0"/>
+          </a:p>
+        </p:txBody>
+      </p:sp>
+      <p:sp>
+        <p:nvSpPr>
+          <p:cNvPr id="3" name="Content Placeholder 2"/>
+          <p:cNvSpPr>
+            <a:spLocks noGrp="1"/>
+          </p:cNvSpPr>
+          <p:nvPr>
+            <p:ph idx="1"/>
+          </p:nvPr>
+        </p:nvSpPr>
+        <p:spPr/>
+        <p:txBody>
+          <a:bodyPr/>
+          <a:lstStyle/>
+          <a:p>
+            <a:r>
+              <a:rPr lang="en-US" dirty="0" smtClean="0"/>
+              <a:t>LINQ allows query operators like Where and Select to be combined</a:t>
+            </a:r>
+          </a:p>
+          <a:p>
+            <a:r>
+              <a:rPr lang="en-US" dirty="0" smtClean="0"/>
+              <a:t>For example, what are the names of all products with price less than 4?</a:t>
+            </a:r>
+            <a:endParaRPr lang="en-US" dirty="0"/>
+          </a:p>
+        </p:txBody>
+      </p:sp>
+      <p:sp>
+        <p:nvSpPr>
+          <p:cNvPr id="5" name="Rectangle 4"/>
+          <p:cNvSpPr/>
+          <p:nvPr/>
+        </p:nvSpPr>
+        <p:spPr>
+          <a:xfrm>
+            <a:off x="609600" y="4038600"/>
+            <a:ext cx="8153400" cy="1785104"/>
+          </a:xfrm>
+          <a:prstGeom prst="rect">
+            <a:avLst/>
+          </a:prstGeom>
+        </p:spPr>
+        <p:txBody>
+          <a:bodyPr wrap="square">
+            <a:spAutoFit/>
+          </a:bodyPr>
+          <a:lstStyle/>
+          <a:p>
+            <a:r>
+              <a:rPr lang="en-US" sz="2200" dirty="0">
+                <a:solidFill>
+                  <a:srgbClr val="2B91AF"/>
+                </a:solidFill>
+                <a:latin typeface="Consolas"/>
+              </a:rPr>
+              <a:t>Product</a:t>
+            </a:r>
+            <a:r>
+              <a:rPr lang="en-US" sz="2200" dirty="0">
+                <a:solidFill>
+                  <a:prstClr val="black"/>
+                </a:solidFill>
+                <a:latin typeface="Consolas"/>
+              </a:rPr>
+              <a:t>[] products = </a:t>
+            </a:r>
+            <a:r>
+              <a:rPr lang="en-US" sz="2200" dirty="0">
+                <a:solidFill>
+                  <a:srgbClr val="0000FF"/>
+                </a:solidFill>
+                <a:latin typeface="Consolas"/>
+              </a:rPr>
+              <a:t>new</a:t>
+            </a:r>
+            <a:r>
+              <a:rPr lang="en-US" sz="2200" dirty="0">
+                <a:solidFill>
+                  <a:prstClr val="black"/>
+                </a:solidFill>
+                <a:latin typeface="Consolas"/>
+              </a:rPr>
+              <a:t> </a:t>
+            </a:r>
+            <a:r>
+              <a:rPr lang="en-US" sz="2200" dirty="0">
+                <a:solidFill>
+                  <a:srgbClr val="2B91AF"/>
+                </a:solidFill>
+                <a:latin typeface="Consolas"/>
+              </a:rPr>
+              <a:t>Product</a:t>
+            </a:r>
+            <a:r>
+              <a:rPr lang="en-US" sz="2200" dirty="0">
+                <a:solidFill>
+                  <a:prstClr val="black"/>
+                </a:solidFill>
+                <a:latin typeface="Consolas"/>
+              </a:rPr>
+              <a:t>[] </a:t>
+            </a:r>
+            <a:r>
+              <a:rPr lang="en-US" sz="2200" dirty="0" smtClean="0">
+                <a:solidFill>
+                  <a:prstClr val="black"/>
+                </a:solidFill>
+                <a:latin typeface="Consolas"/>
+              </a:rPr>
+              <a:t>{…};</a:t>
+            </a:r>
+            <a:endParaRPr lang="en-US" sz="2200" dirty="0">
+              <a:solidFill>
+                <a:prstClr val="black"/>
+              </a:solidFill>
+              <a:latin typeface="Consolas"/>
+            </a:endParaRPr>
+          </a:p>
+          <a:p>
+            <a:r>
+              <a:rPr lang="en-US" sz="2200" dirty="0" err="1" smtClean="0">
+                <a:solidFill>
+                  <a:srgbClr val="2B91AF"/>
+                </a:solidFill>
+                <a:latin typeface="Consolas"/>
+              </a:rPr>
+              <a:t>IEnumerable</a:t>
+            </a:r>
+            <a:r>
+              <a:rPr lang="en-US" sz="2200" dirty="0" smtClean="0">
+                <a:solidFill>
+                  <a:prstClr val="black"/>
+                </a:solidFill>
+                <a:latin typeface="Consolas"/>
+              </a:rPr>
+              <a:t>&lt;</a:t>
+            </a:r>
+            <a:r>
+              <a:rPr lang="en-US" sz="2200" dirty="0" smtClean="0">
+                <a:solidFill>
+                  <a:srgbClr val="0000FF"/>
+                </a:solidFill>
+                <a:latin typeface="Consolas"/>
+              </a:rPr>
+              <a:t>string</a:t>
+            </a:r>
+            <a:r>
+              <a:rPr lang="en-US" sz="2200" dirty="0">
+                <a:solidFill>
+                  <a:prstClr val="black"/>
+                </a:solidFill>
+                <a:latin typeface="Consolas"/>
+              </a:rPr>
+              <a:t>&gt; query =</a:t>
+            </a:r>
+          </a:p>
+          <a:p>
+            <a:r>
+              <a:rPr lang="en-US" sz="2200" dirty="0" smtClean="0">
+                <a:solidFill>
+                  <a:prstClr val="black"/>
+                </a:solidFill>
+                <a:latin typeface="Consolas"/>
+              </a:rPr>
+              <a:t>    </a:t>
+            </a:r>
+            <a:r>
+              <a:rPr lang="en-US" sz="2200" dirty="0" err="1" smtClean="0">
+                <a:solidFill>
+                  <a:prstClr val="black"/>
+                </a:solidFill>
+                <a:latin typeface="Consolas"/>
+              </a:rPr>
+              <a:t>products.Where</a:t>
+            </a:r>
+            <a:r>
+              <a:rPr lang="en-US" sz="2200" dirty="0" smtClean="0">
+                <a:solidFill>
+                  <a:prstClr val="black"/>
+                </a:solidFill>
+                <a:latin typeface="Consolas"/>
+              </a:rPr>
+              <a:t>(v </a:t>
+            </a:r>
+            <a:r>
+              <a:rPr lang="en-US" sz="2200" dirty="0">
+                <a:solidFill>
+                  <a:prstClr val="black"/>
+                </a:solidFill>
+                <a:latin typeface="Consolas"/>
+              </a:rPr>
+              <a:t>=&gt; </a:t>
+            </a:r>
+            <a:r>
+              <a:rPr lang="en-US" sz="2200" dirty="0" err="1">
+                <a:solidFill>
+                  <a:prstClr val="black"/>
+                </a:solidFill>
+                <a:latin typeface="Consolas"/>
+              </a:rPr>
+              <a:t>v.price</a:t>
+            </a:r>
+            <a:r>
+              <a:rPr lang="en-US" sz="2200" dirty="0">
+                <a:solidFill>
+                  <a:prstClr val="black"/>
+                </a:solidFill>
+                <a:latin typeface="Consolas"/>
+              </a:rPr>
+              <a:t> &lt; 4</a:t>
+            </a:r>
+            <a:r>
+              <a:rPr lang="en-US" sz="2200" dirty="0" smtClean="0">
+                <a:solidFill>
+                  <a:prstClr val="black"/>
+                </a:solidFill>
+                <a:latin typeface="Consolas"/>
+              </a:rPr>
+              <a:t>)</a:t>
+            </a:r>
+          </a:p>
+          <a:p>
+            <a:r>
+              <a:rPr lang="en-US" sz="2200" dirty="0" smtClean="0">
+                <a:solidFill>
+                  <a:prstClr val="black"/>
+                </a:solidFill>
+                <a:latin typeface="Consolas"/>
+              </a:rPr>
+              <a:t>            .Select(v =&gt; v.name);</a:t>
+            </a:r>
+          </a:p>
+          <a:p>
+            <a:r>
+              <a:rPr lang="en-US" sz="2200" dirty="0" smtClean="0">
+                <a:solidFill>
+                  <a:srgbClr val="0000FF"/>
+                </a:solidFill>
+                <a:latin typeface="Consolas"/>
+              </a:rPr>
+              <a:t>string</a:t>
+            </a:r>
+            <a:r>
+              <a:rPr lang="en-US" sz="2200" dirty="0">
+                <a:solidFill>
+                  <a:prstClr val="black"/>
+                </a:solidFill>
+                <a:latin typeface="Consolas"/>
+              </a:rPr>
+              <a:t>[] </a:t>
+            </a:r>
+            <a:r>
+              <a:rPr lang="en-US" sz="2200" dirty="0" err="1">
+                <a:solidFill>
+                  <a:prstClr val="black"/>
+                </a:solidFill>
+                <a:latin typeface="Consolas"/>
+              </a:rPr>
+              <a:t>productNames</a:t>
+            </a:r>
+            <a:r>
+              <a:rPr lang="en-US" sz="2200" dirty="0">
+                <a:solidFill>
+                  <a:prstClr val="black"/>
+                </a:solidFill>
+                <a:latin typeface="Consolas"/>
+              </a:rPr>
+              <a:t> = </a:t>
+            </a:r>
+            <a:r>
+              <a:rPr lang="en-US" sz="2200" dirty="0" err="1">
+                <a:solidFill>
+                  <a:prstClr val="black"/>
+                </a:solidFill>
+                <a:latin typeface="Consolas"/>
+              </a:rPr>
+              <a:t>query.ToArray</a:t>
+            </a:r>
+            <a:r>
+              <a:rPr lang="en-US" sz="2200" dirty="0">
+                <a:solidFill>
+                  <a:prstClr val="black"/>
+                </a:solidFill>
+                <a:latin typeface="Consolas"/>
+              </a:rPr>
+              <a:t>();</a:t>
+            </a:r>
+          </a:p>
+        </p:txBody>
+      </p:sp>
+    </p:spTree>
+    <p:extLst>
+      <p:ext uri="{BB962C8B-B14F-4D97-AF65-F5344CB8AC3E}">
+        <p14:creationId xmlns:p14="http://schemas.microsoft.com/office/powerpoint/2010/main" val="571037913"/>
+      </p:ext>
+    </p:extLst>
+  </p:cSld>
+  <p:clrMapOvr>
+    <a:masterClrMapping/>
+  </p:clrMapOvr>
+  <p:timing>
+    <p:tnLst>
+      <p:par>
+        <p:cTn id="1" dur="indefinite" restart="never" nodeType="tmRoot"/>
+      </p:par>
+    </p:tnLst>
+  </p:timing>
 </p:sld>
 </file>
 
@@ -22531,7 +22503,7 @@
         <p:spPr>
           <a:xfrm>
             <a:off x="609600" y="4038600"/>
-            <a:ext cx="8153400" cy="1785104"/>
+            <a:ext cx="8153400" cy="2123658"/>
           </a:xfrm>
           <a:prstGeom prst="rect">
             <a:avLst/>
@@ -22544,7 +22516,7 @@
           <a:lstStyle/>
           <a:p>
             <a:r>
-              <a:rPr lang="en-US" sz="2200" dirty="0">
+              <a:rPr lang="en-US" sz="2200" dirty="0" smtClean="0">
                 <a:solidFill>
                   <a:srgbClr val="2B91AF"/>
                 </a:solidFill>
@@ -22655,6 +22627,53 @@
             <a:r>
               <a:rPr lang="en-US" sz="2200" dirty="0" smtClean="0">
                 <a:solidFill>
+                  <a:srgbClr val="0000FF"/>
+                </a:solidFill>
+                <a:latin typeface="Consolas"/>
+              </a:rPr>
+              <a:t>    from</a:t>
+            </a:r>
+            <a:r>
+              <a:rPr lang="en-US" sz="2200" dirty="0" smtClean="0">
+                <a:solidFill>
+                  <a:prstClr val="black"/>
+                </a:solidFill>
+                <a:latin typeface="Consolas"/>
+              </a:rPr>
+              <a:t> </a:t>
+            </a:r>
+            <a:r>
+              <a:rPr lang="en-US" sz="2200" dirty="0">
+                <a:solidFill>
+                  <a:prstClr val="black"/>
+                </a:solidFill>
+                <a:latin typeface="Consolas"/>
+              </a:rPr>
+              <a:t>v </a:t>
+            </a:r>
+            <a:r>
+              <a:rPr lang="en-US" sz="2200" dirty="0">
+                <a:solidFill>
+                  <a:srgbClr val="0000FF"/>
+                </a:solidFill>
+                <a:latin typeface="Consolas"/>
+              </a:rPr>
+              <a:t>in</a:t>
+            </a:r>
+            <a:r>
+              <a:rPr lang="en-US" sz="2200" dirty="0">
+                <a:solidFill>
+                  <a:prstClr val="black"/>
+                </a:solidFill>
+                <a:latin typeface="Consolas"/>
+              </a:rPr>
+              <a:t> products</a:t>
+            </a:r>
+          </a:p>
+          <a:p>
+            <a:r>
+              <a:rPr lang="en-US" sz="2200" dirty="0">
+                <a:solidFill>
                   <a:prstClr val="black"/>
                 </a:solidFill>
                 <a:latin typeface="Consolas"/>
@@ -22662,31 +22681,22 @@
               <a:t>    </a:t>
             </a:r>
             <a:r>
-              <a:rPr lang="en-US" sz="2200" dirty="0" err="1" smtClean="0">
-                <a:solidFill>
-                  <a:prstClr val="black"/>
-                </a:solidFill>
-                <a:latin typeface="Consolas"/>
-              </a:rPr>
-              <a:t>products.Where</a:t>
-            </a:r>
-            <a:r>
               <a:rPr lang="en-US" sz="2200" dirty="0" smtClean="0">
                 <a:solidFill>
-                  <a:prstClr val="black"/>
-                </a:solidFill>
-                <a:latin typeface="Consolas"/>
-              </a:rPr>
-              <a:t>(v </a:t>
-            </a:r>
-            <a:r>
-              <a:rPr lang="en-US" sz="2200" dirty="0">
-                <a:solidFill>
-                  <a:prstClr val="black"/>
-                </a:solidFill>
-                <a:latin typeface="Consolas"/>
-              </a:rPr>
-              <a:t>=&gt; </a:t>
+                  <a:srgbClr val="0000FF"/>
+                </a:solidFill>
+                <a:latin typeface="Consolas"/>
+              </a:rPr>
+              <a:t>where</a:t>
+            </a:r>
+            <a:r>
+              <a:rPr lang="en-US" sz="2200" dirty="0" smtClean="0">
+                <a:solidFill>
+                  <a:prstClr val="black"/>
+                </a:solidFill>
+                <a:latin typeface="Consolas"/>
+              </a:rPr>
+              <a:t> </a:t>
             </a:r>
             <a:r>
               <a:rPr lang="en-US" sz="2200" dirty="0" err="1">
@@ -22706,17 +22716,26 @@
               </a:rPr>
               <a:t> &lt; 4</a:t>
             </a:r>
+          </a:p>
+          <a:p>
+            <a:r>
+              <a:rPr lang="en-US" sz="2200" dirty="0">
+                <a:solidFill>
+                  <a:prstClr val="black"/>
+                </a:solidFill>
+                <a:latin typeface="Consolas"/>
+              </a:rPr>
+              <a:t>    </a:t>
+            </a:r>
             <a:r>
               <a:rPr lang="en-US" sz="2200" dirty="0" smtClean="0">
                 <a:solidFill>
-                  <a:prstClr val="black"/>
-                </a:solidFill>
-                <a:latin typeface="Consolas"/>
-              </a:rPr>
-              <a:t>)</a:t>
-            </a:r>
-          </a:p>
-          <a:p>
+                  <a:srgbClr val="0000FF"/>
+                </a:solidFill>
+                <a:latin typeface="Consolas"/>
+              </a:rPr>
+              <a:t>select</a:t>
+            </a:r>
             <a:r>
               <a:rPr lang="en-US" sz="2200" dirty="0" smtClean="0">
                 <a:solidFill>
@@ -22724,7 +22743,16 @@
                 </a:solidFill>
                 <a:latin typeface="Consolas"/>
               </a:rPr>
-              <a:t>            .Select(v =&gt; v.name);</a:t>
+              <a:t> </a:t>
+            </a:r>
+            <a:r>
+              <a:rPr lang="en-US" sz="2200" dirty="0">
+                <a:solidFill>
+                  <a:prstClr val="black"/>
+                </a:solidFill>
+                <a:latin typeface="Consolas"/>
+              </a:rPr>
+              <a:t>v.name;</a:t>
             </a:r>
           </a:p>
           <a:p>
@@ -22782,19 +22810,27 @@
               </a:rPr>
               <a:t>();</a:t>
             </a:r>
+            <a:endParaRPr lang="en-US" sz="2200" dirty="0"/>
           </a:p>
         </p:txBody>
       </p:sp>
     </p:spTree>
     <p:extLst>
       <p:ext uri="{BB962C8B-B14F-4D97-AF65-F5344CB8AC3E}">
-        <p14:creationId xmlns:p14="http://schemas.microsoft.com/office/powerpoint/2010/main" val="571037913"/>
+        <p14:creationId xmlns:p14="http://schemas.microsoft.com/office/powerpoint/2010/main" val="1896866657"/>
       </p:ext>
     </p:extLst>
   </p:cSld>
   <p:clrMapOvr>
     <a:masterClrMapping/>
   </p:clrMapOvr>
+  <p:timing>
+    <p:tnLst>
+      <p:par>
+        <p:cTn id="1" dur="indefinite" restart="never" nodeType="tmRoot"/>
+      </p:par>
+    </p:tnLst>
+  </p:timing>
 </p:sld>
 </file>
 
@@ -22832,408 +22868,6 @@
           <a:p>
             <a:r>
               <a:rPr lang="en-US" dirty="0" smtClean="0"/>
-              <a:t>Using Where and Select Together</a:t>
-            </a:r>
-            <a:endParaRPr lang="en-US" dirty="0"/>
-          </a:p>
-        </p:txBody>
-      </p:sp>
-      <p:sp>
-        <p:nvSpPr>
-          <p:cNvPr id="3" name="Content Placeholder 2"/>
-          <p:cNvSpPr>
-            <a:spLocks noGrp="1"/>
-          </p:cNvSpPr>
-          <p:nvPr>
-            <p:ph idx="1"/>
-          </p:nvPr>
-        </p:nvSpPr>
-        <p:spPr/>
-        <p:txBody>
-          <a:bodyPr/>
-          <a:lstStyle/>
-          <a:p>
-            <a:r>
-              <a:rPr lang="en-US" dirty="0" smtClean="0"/>
-              <a:t>LINQ allows query operators like Where and Select to be combined</a:t>
-            </a:r>
-          </a:p>
-          <a:p>
-            <a:r>
-              <a:rPr lang="en-US" dirty="0" smtClean="0"/>
-              <a:t>For example, what are the names of all products with price less than 4?</a:t>
-            </a:r>
-            <a:endParaRPr lang="en-US" dirty="0"/>
-          </a:p>
-        </p:txBody>
-      </p:sp>
-      <p:sp>
-        <p:nvSpPr>
-          <p:cNvPr id="5" name="Rectangle 4"/>
-          <p:cNvSpPr/>
-          <p:nvPr/>
-        </p:nvSpPr>
-        <p:spPr>
-          <a:xfrm>
-            <a:off x="609600" y="4038600"/>
-            <a:ext cx="8153400" cy="2123658"/>
-          </a:xfrm>
-          <a:prstGeom prst="rect">
-            <a:avLst/>
-          </a:prstGeom>
-        </p:spPr>
-        <p:txBody>
-          <a:bodyPr wrap="square">
-            <a:spAutoFit/>
-          </a:bodyPr>
-          <a:lstStyle/>
-          <a:p>
-            <a:r>
-              <a:rPr lang="en-US" sz="2200" dirty="0" smtClean="0">
-                <a:solidFill>
-                  <a:srgbClr val="2B91AF"/>
-                </a:solidFill>
-                <a:latin typeface="Consolas"/>
-              </a:rPr>
-              <a:t>Product</a:t>
-            </a:r>
-            <a:r>
-              <a:rPr lang="en-US" sz="2200" dirty="0">
-                <a:solidFill>
-                  <a:prstClr val="black"/>
-                </a:solidFill>
-                <a:latin typeface="Consolas"/>
-              </a:rPr>
-              <a:t>[] products = </a:t>
-            </a:r>
-            <a:r>
-              <a:rPr lang="en-US" sz="2200" dirty="0">
-                <a:solidFill>
-                  <a:srgbClr val="0000FF"/>
-                </a:solidFill>
-                <a:latin typeface="Consolas"/>
-              </a:rPr>
-              <a:t>new</a:t>
-            </a:r>
-            <a:r>
-              <a:rPr lang="en-US" sz="2200" dirty="0">
-                <a:solidFill>
-                  <a:prstClr val="black"/>
-                </a:solidFill>
-                <a:latin typeface="Consolas"/>
-              </a:rPr>
-              <a:t> </a:t>
-            </a:r>
-            <a:r>
-              <a:rPr lang="en-US" sz="2200" dirty="0">
-                <a:solidFill>
-                  <a:srgbClr val="2B91AF"/>
-                </a:solidFill>
-                <a:latin typeface="Consolas"/>
-              </a:rPr>
-              <a:t>Product</a:t>
-            </a:r>
-            <a:r>
-              <a:rPr lang="en-US" sz="2200" dirty="0">
-                <a:solidFill>
-                  <a:prstClr val="black"/>
-                </a:solidFill>
-                <a:latin typeface="Consolas"/>
-              </a:rPr>
-              <a:t>[] </a:t>
-            </a:r>
-            <a:r>
-              <a:rPr lang="en-US" sz="2200" dirty="0" smtClean="0">
-                <a:solidFill>
-                  <a:prstClr val="black"/>
-                </a:solidFill>
-                <a:latin typeface="Consolas"/>
-              </a:rPr>
-              <a:t>{…};</a:t>
-            </a:r>
-            <a:endParaRPr lang="en-US" sz="2200" dirty="0">
-              <a:solidFill>
-                <a:prstClr val="black"/>
-              </a:solidFill>
-              <a:latin typeface="Consolas"/>
-            </a:endParaRPr>
-          </a:p>
-          <a:p>
-            <a:r>
-              <a:rPr lang="en-US" sz="2200" dirty="0" err="1" smtClean="0">
-                <a:solidFill>
-                  <a:srgbClr val="2B91AF"/>
-                </a:solidFill>
-                <a:latin typeface="Consolas"/>
-              </a:rPr>
-              <a:t>IEnumerable</a:t>
-            </a:r>
-            <a:r>
-              <a:rPr lang="en-US" sz="2200" dirty="0" smtClean="0">
-                <a:solidFill>
-                  <a:prstClr val="black"/>
-                </a:solidFill>
-                <a:latin typeface="Consolas"/>
-              </a:rPr>
-              <a:t>&lt;</a:t>
-            </a:r>
-            <a:r>
-              <a:rPr lang="en-US" sz="2200" dirty="0" smtClean="0">
-                <a:solidFill>
-                  <a:srgbClr val="0000FF"/>
-                </a:solidFill>
-                <a:latin typeface="Consolas"/>
-              </a:rPr>
-              <a:t>string</a:t>
-            </a:r>
-            <a:r>
-              <a:rPr lang="en-US" sz="2200" dirty="0">
-                <a:solidFill>
-                  <a:prstClr val="black"/>
-                </a:solidFill>
-                <a:latin typeface="Consolas"/>
-              </a:rPr>
-              <a:t>&gt; query =</a:t>
-            </a:r>
-          </a:p>
-          <a:p>
-            <a:r>
-              <a:rPr lang="en-US" sz="2200" dirty="0" smtClean="0">
-                <a:solidFill>
-                  <a:srgbClr val="0000FF"/>
-                </a:solidFill>
-                <a:latin typeface="Consolas"/>
-              </a:rPr>
-              <a:t>    from</a:t>
-            </a:r>
-            <a:r>
-              <a:rPr lang="en-US" sz="2200" dirty="0" smtClean="0">
-                <a:solidFill>
-                  <a:prstClr val="black"/>
-                </a:solidFill>
-                <a:latin typeface="Consolas"/>
-              </a:rPr>
-              <a:t> </a:t>
-            </a:r>
-            <a:r>
-              <a:rPr lang="en-US" sz="2200" dirty="0">
-                <a:solidFill>
-                  <a:prstClr val="black"/>
-                </a:solidFill>
-                <a:latin typeface="Consolas"/>
-              </a:rPr>
-              <a:t>v </a:t>
-            </a:r>
-            <a:r>
-              <a:rPr lang="en-US" sz="2200" dirty="0">
-                <a:solidFill>
-                  <a:srgbClr val="0000FF"/>
-                </a:solidFill>
-                <a:latin typeface="Consolas"/>
-              </a:rPr>
-              <a:t>in</a:t>
-            </a:r>
-            <a:r>
-              <a:rPr lang="en-US" sz="2200" dirty="0">
-                <a:solidFill>
-                  <a:prstClr val="black"/>
-                </a:solidFill>
-                <a:latin typeface="Consolas"/>
-              </a:rPr>
-              <a:t> products</a:t>
-            </a:r>
-          </a:p>
-          <a:p>
-            <a:r>
-              <a:rPr lang="en-US" sz="2200" dirty="0">
-                <a:solidFill>
-                  <a:prstClr val="black"/>
-                </a:solidFill>
-                <a:latin typeface="Consolas"/>
-              </a:rPr>
-              <a:t>    </a:t>
-            </a:r>
-            <a:r>
-              <a:rPr lang="en-US" sz="2200" dirty="0" smtClean="0">
-                <a:solidFill>
-                  <a:srgbClr val="0000FF"/>
-                </a:solidFill>
-                <a:latin typeface="Consolas"/>
-              </a:rPr>
-              <a:t>where</a:t>
-            </a:r>
-            <a:r>
-              <a:rPr lang="en-US" sz="2200" dirty="0" smtClean="0">
-                <a:solidFill>
-                  <a:prstClr val="black"/>
-                </a:solidFill>
-                <a:latin typeface="Consolas"/>
-              </a:rPr>
-              <a:t> </a:t>
-            </a:r>
-            <a:r>
-              <a:rPr lang="en-US" sz="2200" dirty="0" err="1">
-                <a:solidFill>
-                  <a:prstClr val="black"/>
-                </a:solidFill>
-                <a:latin typeface="Consolas"/>
-              </a:rPr>
-              <a:t>v.price</a:t>
-            </a:r>
-            <a:r>
-              <a:rPr lang="en-US" sz="2200" dirty="0">
-                <a:solidFill>
-                  <a:prstClr val="black"/>
-                </a:solidFill>
-                <a:latin typeface="Consolas"/>
-              </a:rPr>
-              <a:t> &lt; 4</a:t>
-            </a:r>
-          </a:p>
-          <a:p>
-            <a:r>
-              <a:rPr lang="en-US" sz="2200" dirty="0">
-                <a:solidFill>
-                  <a:prstClr val="black"/>
-                </a:solidFill>
-                <a:latin typeface="Consolas"/>
-              </a:rPr>
-              <a:t>    </a:t>
-            </a:r>
-            <a:r>
-              <a:rPr lang="en-US" sz="2200" dirty="0" smtClean="0">
-                <a:solidFill>
-                  <a:srgbClr val="0000FF"/>
-                </a:solidFill>
-                <a:latin typeface="Consolas"/>
-              </a:rPr>
-              <a:t>select</a:t>
-            </a:r>
-            <a:r>
-              <a:rPr lang="en-US" sz="2200" dirty="0" smtClean="0">
-                <a:solidFill>
-                  <a:prstClr val="black"/>
-                </a:solidFill>
-                <a:latin typeface="Consolas"/>
-              </a:rPr>
-              <a:t> </a:t>
-            </a:r>
-            <a:r>
-              <a:rPr lang="en-US" sz="2200" dirty="0">
-                <a:solidFill>
-                  <a:prstClr val="black"/>
-                </a:solidFill>
-                <a:latin typeface="Consolas"/>
-              </a:rPr>
-              <a:t>v.name;</a:t>
-            </a:r>
-          </a:p>
-          <a:p>
-            <a:r>
-              <a:rPr lang="en-US" sz="2200" dirty="0" smtClean="0">
-                <a:solidFill>
-                  <a:srgbClr val="0000FF"/>
-                </a:solidFill>
-                <a:latin typeface="Consolas"/>
-              </a:rPr>
-              <a:t>string</a:t>
-            </a:r>
-            <a:r>
-              <a:rPr lang="en-US" sz="2200" dirty="0">
-                <a:solidFill>
-                  <a:prstClr val="black"/>
-                </a:solidFill>
-                <a:latin typeface="Consolas"/>
-              </a:rPr>
-              <a:t>[] </a:t>
-            </a:r>
-            <a:r>
-              <a:rPr lang="en-US" sz="2200" dirty="0" err="1">
-                <a:solidFill>
-                  <a:prstClr val="black"/>
-                </a:solidFill>
-                <a:latin typeface="Consolas"/>
-              </a:rPr>
-              <a:t>productNames</a:t>
-            </a:r>
-            <a:r>
-              <a:rPr lang="en-US" sz="2200" dirty="0">
-                <a:solidFill>
-                  <a:prstClr val="black"/>
-                </a:solidFill>
-                <a:latin typeface="Consolas"/>
-              </a:rPr>
-              <a:t> = </a:t>
-            </a:r>
-            <a:r>
-              <a:rPr lang="en-US" sz="2200" dirty="0" err="1">
-                <a:solidFill>
-                  <a:prstClr val="black"/>
-                </a:solidFill>
-                <a:latin typeface="Consolas"/>
-              </a:rPr>
-              <a:t>query.ToArray</a:t>
-            </a:r>
-            <a:r>
-              <a:rPr lang="en-US" sz="2200" dirty="0">
-                <a:solidFill>
-                  <a:prstClr val="black"/>
-                </a:solidFill>
-                <a:latin typeface="Consolas"/>
-              </a:rPr>
-              <a:t>();</a:t>
-            </a:r>
-            <a:endParaRPr lang="en-US" sz="2200" dirty="0"/>
-          </a:p>
-        </p:txBody>
-      </p:sp>
-    </p:spTree>
-    <p:extLst>
-      <p:ext uri="{BB962C8B-B14F-4D97-AF65-F5344CB8AC3E}">
-        <p14:creationId xmlns:p14="http://schemas.microsoft.com/office/powerpoint/2010/main" val="1896866657"/>
-      </p:ext>
-    </p:extLst>
-  </p:cSld>
-  <p:clrMapOvr>
-    <a:masterClrMapping/>
-  </p:clrMapOvr>
-</p:sld>
-</file>
-
-<file path=ppt/slides/slide47.xml><?xml version="1.0" encoding="utf-8"?>
-<p:sld xmlns:a="http://schemas.openxmlformats.org/drawingml/2006/main" xmlns:r="http://schemas.openxmlformats.org/officeDocument/2006/relationships" xmlns:p="http://schemas.openxmlformats.org/presentationml/2006/main">
-  <p:cSld>
-    <p:spTree>
-      <p:nvGrpSpPr>
-        <p:cNvPr id="1" name=""/>
-        <p:cNvGrpSpPr/>
-        <p:nvPr/>
-      </p:nvGrpSpPr>
-      <p:grpSpPr>
-        <a:xfrm>
-          <a:off x="0" y="0"/>
-          <a:ext cx="0" cy="0"/>
-          <a:chOff x="0" y="0"/>
-          <a:chExt cx="0" cy="0"/>
-        </a:xfrm>
-      </p:grpSpPr>
-      <p:sp>
-        <p:nvSpPr>
-          <p:cNvPr id="2" name="Title 1"/>
-          <p:cNvSpPr>
-            <a:spLocks noGrp="1"/>
-          </p:cNvSpPr>
-          <p:nvPr>
-            <p:ph type="title"/>
-          </p:nvPr>
-        </p:nvSpPr>
-        <p:spPr/>
-        <p:txBody>
-          <a:bodyPr/>
-          <a:lstStyle/>
-          <a:p>
-            <a:r>
-              <a:rPr lang="en-US" dirty="0" smtClean="0"/>
               <a:t>Aggregate</a:t>
             </a:r>
             <a:endParaRPr lang="en-US" dirty="0"/>
@@ -23300,10 +22934,17 @@
   <p:clrMapOvr>
     <a:masterClrMapping/>
   </p:clrMapOvr>
+  <p:timing>
+    <p:tnLst>
+      <p:par>
+        <p:cTn id="1" dur="indefinite" restart="never" nodeType="tmRoot"/>
+      </p:par>
+    </p:tnLst>
+  </p:timing>
 </p:sld>
 </file>
 
-<file path=ppt/slides/slide48.xml><?xml version="1.0" encoding="utf-8"?>
+<file path=ppt/slides/slide47.xml><?xml version="1.0" encoding="utf-8"?>
 <p:sld xmlns:a="http://schemas.openxmlformats.org/drawingml/2006/main" xmlns:r="http://schemas.openxmlformats.org/officeDocument/2006/relationships" xmlns:p="http://schemas.openxmlformats.org/presentationml/2006/main">
   <p:cSld>
     <p:spTree>
@@ -23815,10 +23456,17 @@
   <p:clrMapOvr>
     <a:masterClrMapping/>
   </p:clrMapOvr>
+  <p:timing>
+    <p:tnLst>
+      <p:par>
+        <p:cTn id="1" dur="indefinite" restart="never" nodeType="tmRoot"/>
+      </p:par>
+    </p:tnLst>
+  </p:timing>
 </p:sld>
 </file>
 
-<file path=ppt/slides/slide49.xml><?xml version="1.0" encoding="utf-8"?>
+<file path=ppt/slides/slide48.xml><?xml version="1.0" encoding="utf-8"?>
 <p:sld xmlns:a="http://schemas.openxmlformats.org/drawingml/2006/main" xmlns:r="http://schemas.openxmlformats.org/officeDocument/2006/relationships" xmlns:p="http://schemas.openxmlformats.org/presentationml/2006/main">
   <p:cSld>
     <p:spTree>
@@ -24373,6 +24021,131 @@
   <p:clrMapOvr>
     <a:masterClrMapping/>
   </p:clrMapOvr>
+  <p:timing>
+    <p:tnLst>
+      <p:par>
+        <p:cTn id="1" dur="indefinite" restart="never" nodeType="tmRoot"/>
+      </p:par>
+    </p:tnLst>
+  </p:timing>
+</p:sld>
+</file>
+
+<file path=ppt/slides/slide49.xml><?xml version="1.0" encoding="utf-8"?>
+<p:sld xmlns:a="http://schemas.openxmlformats.org/drawingml/2006/main" xmlns:r="http://schemas.openxmlformats.org/officeDocument/2006/relationships" xmlns:p="http://schemas.openxmlformats.org/presentationml/2006/main">
+  <p:cSld>
+    <p:spTree>
+      <p:nvGrpSpPr>
+        <p:cNvPr id="1" name=""/>
+        <p:cNvGrpSpPr/>
+        <p:nvPr/>
+      </p:nvGrpSpPr>
+      <p:grpSpPr>
+        <a:xfrm>
+          <a:off x="0" y="0"/>
+          <a:ext cx="0" cy="0"/>
+          <a:chOff x="0" y="0"/>
+          <a:chExt cx="0" cy="0"/>
+        </a:xfrm>
+      </p:grpSpPr>
+      <p:sp>
+        <p:nvSpPr>
+          <p:cNvPr id="2" name="Title 1"/>
+          <p:cNvSpPr>
+            <a:spLocks noGrp="1"/>
+          </p:cNvSpPr>
+          <p:nvPr>
+            <p:ph type="title"/>
+          </p:nvPr>
+        </p:nvSpPr>
+        <p:spPr/>
+        <p:txBody>
+          <a:bodyPr/>
+          <a:lstStyle/>
+          <a:p>
+            <a:r>
+              <a:rPr lang="en-US" dirty="0" smtClean="0"/>
+              <a:t>More Operators</a:t>
+            </a:r>
+            <a:endParaRPr lang="en-US" dirty="0"/>
+          </a:p>
+        </p:txBody>
+      </p:sp>
+      <p:sp>
+        <p:nvSpPr>
+          <p:cNvPr id="3" name="Content Placeholder 2"/>
+          <p:cNvSpPr>
+            <a:spLocks noGrp="1"/>
+          </p:cNvSpPr>
+          <p:nvPr>
+            <p:ph idx="1"/>
+          </p:nvPr>
+        </p:nvSpPr>
+        <p:spPr/>
+        <p:txBody>
+          <a:bodyPr/>
+          <a:lstStyle/>
+          <a:p>
+            <a:r>
+              <a:rPr lang="en-US" dirty="0" smtClean="0"/>
+              <a:t>Max, Min, Reverse, </a:t>
+            </a:r>
+            <a:r>
+              <a:rPr lang="en-US" dirty="0" err="1" smtClean="0"/>
+              <a:t>OrderBy</a:t>
+            </a:r>
+            <a:r>
+              <a:rPr lang="en-US" dirty="0" smtClean="0"/>
+              <a:t>, </a:t>
+            </a:r>
+            <a:r>
+              <a:rPr lang="en-US" dirty="0" err="1" smtClean="0"/>
+              <a:t>etc</a:t>
+            </a:r>
+            <a:endParaRPr lang="en-US" dirty="0" smtClean="0"/>
+          </a:p>
+          <a:p>
+            <a:r>
+              <a:rPr lang="en-US" dirty="0" smtClean="0"/>
+              <a:t>See </a:t>
+            </a:r>
+            <a:r>
+              <a:rPr lang="en-US" dirty="0">
+                <a:hlinkClick r:id="rId2"/>
+              </a:rPr>
+              <a:t>http://</a:t>
+            </a:r>
+            <a:r>
+              <a:rPr lang="en-US" dirty="0" smtClean="0">
+                <a:hlinkClick r:id="rId2"/>
+              </a:rPr>
+              <a:t>msdn.microsoft.com/en-us/vcsharp/aa336746</a:t>
+            </a:r>
+            <a:r>
+              <a:rPr lang="en-US" dirty="0" smtClean="0"/>
+              <a:t> for examples</a:t>
+            </a:r>
+            <a:endParaRPr lang="en-US" dirty="0"/>
+          </a:p>
+        </p:txBody>
+      </p:sp>
+    </p:spTree>
+    <p:extLst>
+      <p:ext uri="{BB962C8B-B14F-4D97-AF65-F5344CB8AC3E}">
+        <p14:creationId xmlns:p14="http://schemas.microsoft.com/office/powerpoint/2010/main" val="3493490543"/>
+      </p:ext>
+    </p:extLst>
+  </p:cSld>
+  <p:clrMapOvr>
+    <a:masterClrMapping/>
+  </p:clrMapOvr>
+  <p:timing>
+    <p:tnLst>
+      <p:par>
+        <p:cTn id="1" dur="indefinite" restart="never" nodeType="tmRoot"/>
+      </p:par>
+    </p:tnLst>
+  </p:timing>
 </p:sld>
 </file>
 
@@ -25183,117 +24956,13 @@
   <p:clrMapOvr>
     <a:masterClrMapping/>
   </p:clrMapOvr>
-</p:sld>
-</file>
-
-<file path=ppt/slides/slide50.xml><?xml version="1.0" encoding="utf-8"?>
-<p:sld xmlns:a="http://schemas.openxmlformats.org/drawingml/2006/main" xmlns:r="http://schemas.openxmlformats.org/officeDocument/2006/relationships" xmlns:p="http://schemas.openxmlformats.org/presentationml/2006/main">
-  <p:cSld>
-    <p:spTree>
-      <p:nvGrpSpPr>
-        <p:cNvPr id="1" name=""/>
-        <p:cNvGrpSpPr/>
-        <p:nvPr/>
-      </p:nvGrpSpPr>
-      <p:grpSpPr>
-        <a:xfrm>
-          <a:off x="0" y="0"/>
-          <a:ext cx="0" cy="0"/>
-          <a:chOff x="0" y="0"/>
-          <a:chExt cx="0" cy="0"/>
-        </a:xfrm>
-      </p:grpSpPr>
-      <p:sp>
-        <p:nvSpPr>
-          <p:cNvPr id="2" name="Title 1"/>
-          <p:cNvSpPr>
-            <a:spLocks noGrp="1"/>
-          </p:cNvSpPr>
-          <p:nvPr>
-            <p:ph type="title"/>
-          </p:nvPr>
-        </p:nvSpPr>
-        <p:spPr/>
-        <p:txBody>
-          <a:bodyPr/>
-          <a:lstStyle/>
-          <a:p>
-            <a:r>
-              <a:rPr lang="en-US" dirty="0" smtClean="0"/>
-              <a:t>More Operators</a:t>
-            </a:r>
-            <a:endParaRPr lang="en-US" dirty="0"/>
-          </a:p>
-        </p:txBody>
-      </p:sp>
-      <p:sp>
-        <p:nvSpPr>
-          <p:cNvPr id="3" name="Content Placeholder 2"/>
-          <p:cNvSpPr>
-            <a:spLocks noGrp="1"/>
-          </p:cNvSpPr>
-          <p:nvPr>
-            <p:ph idx="1"/>
-          </p:nvPr>
-        </p:nvSpPr>
-        <p:spPr/>
-        <p:txBody>
-          <a:bodyPr/>
-          <a:lstStyle/>
-          <a:p>
-            <a:r>
-              <a:rPr lang="en-US" dirty="0" smtClean="0"/>
-              <a:t>Max, Min, Reverse, </a:t>
-            </a:r>
-            <a:r>
-              <a:rPr lang="en-US" dirty="0" err="1" smtClean="0"/>
-              <a:t>OrderBy</a:t>
-            </a:r>
-            <a:r>
-              <a:rPr lang="en-US" dirty="0" smtClean="0"/>
-              <a:t>, </a:t>
-            </a:r>
-            <a:r>
-              <a:rPr lang="en-US" dirty="0" err="1" smtClean="0"/>
-              <a:t>etc</a:t>
-            </a:r>
-            <a:endParaRPr lang="en-US" dirty="0" smtClean="0"/>
-          </a:p>
-          <a:p>
-            <a:r>
-              <a:rPr lang="en-US" dirty="0" smtClean="0"/>
-              <a:t>See </a:t>
-            </a:r>
-            <a:r>
-              <a:rPr lang="en-US" dirty="0">
-                <a:hlinkClick r:id="rId2"/>
-              </a:rPr>
-              <a:t>http://</a:t>
-            </a:r>
-            <a:r>
-              <a:rPr lang="en-US" dirty="0" smtClean="0">
-                <a:hlinkClick r:id="rId2"/>
-              </a:rPr>
-              <a:t>msdn.microsoft.com/en-us/vcsharp/aa336746</a:t>
-            </a:r>
-            <a:r>
-              <a:rPr lang="en-US" dirty="0" smtClean="0"/>
-              <a:t> for examples</a:t>
-            </a:r>
-            <a:endParaRPr lang="en-US" dirty="0"/>
-          </a:p>
-        </p:txBody>
-      </p:sp>
-    </p:spTree>
-    <p:extLst>
-      <p:ext uri="{BB962C8B-B14F-4D97-AF65-F5344CB8AC3E}">
-        <p14:creationId xmlns:p14="http://schemas.microsoft.com/office/powerpoint/2010/main" val="3493490543"/>
-      </p:ext>
-    </p:extLst>
-  </p:cSld>
-  <p:clrMapOvr>
-    <a:masterClrMapping/>
-  </p:clrMapOvr>
+  <p:timing>
+    <p:tnLst>
+      <p:par>
+        <p:cTn id="1" dur="indefinite" restart="never" nodeType="tmRoot"/>
+      </p:par>
+    </p:tnLst>
+  </p:timing>
 </p:sld>
 </file>
 
@@ -26112,6 +25781,13 @@
   <p:clrMapOvr>
     <a:masterClrMapping/>
   </p:clrMapOvr>
+  <p:timing>
+    <p:tnLst>
+      <p:par>
+        <p:cTn id="1" dur="indefinite" restart="never" nodeType="tmRoot"/>
+      </p:par>
+    </p:tnLst>
+  </p:timing>
 </p:sld>
 </file>
 
@@ -26990,6 +26666,13 @@
   <p:clrMapOvr>
     <a:masterClrMapping/>
   </p:clrMapOvr>
+  <p:timing>
+    <p:tnLst>
+      <p:par>
+        <p:cTn id="1" dur="indefinite" restart="never" nodeType="tmRoot"/>
+      </p:par>
+    </p:tnLst>
+  </p:timing>
 </p:sld>
 </file>
 
@@ -27800,6 +27483,13 @@
   <p:clrMapOvr>
     <a:masterClrMapping/>
   </p:clrMapOvr>
+  <p:timing>
+    <p:tnLst>
+      <p:par>
+        <p:cTn id="1" dur="indefinite" restart="never" nodeType="tmRoot"/>
+      </p:par>
+    </p:tnLst>
+  </p:timing>
 </p:sld>
 </file>
 
@@ -28627,6 +28317,13 @@
   <p:clrMapOvr>
     <a:masterClrMapping/>
   </p:clrMapOvr>
+  <p:timing>
+    <p:tnLst>
+      <p:par>
+        <p:cTn id="1" dur="indefinite" restart="never" nodeType="tmRoot"/>
+      </p:par>
+    </p:tnLst>
+  </p:timing>
 </p:sld>
 </file>
 

</xml_diff>